<commit_message>
edit ppt from my_PC
</commit_message>
<xml_diff>
--- a/Kaggle_MoA.pptx
+++ b/Kaggle_MoA.pptx
@@ -202,7 +202,7 @@
           <a:p>
             <a:fld id="{20E8D8B0-DEC6-4D85-AF34-2CB4B66E100B}" type="datetimeFigureOut">
               <a:rPr kumimoji="1" lang="ja-JP" altLang="en-US" smtClean="0"/>
-              <a:t>2020/10/30</a:t>
+              <a:t>2020/11/7</a:t>
             </a:fld>
             <a:endParaRPr kumimoji="1" lang="ja-JP" altLang="en-US"/>
           </a:p>
@@ -545,9 +545,103 @@
           <a:bodyPr/>
           <a:lstStyle/>
           <a:p>
+            <a:pPr marL="0" marR="0" lvl="0" indent="0" algn="l" defTabSz="914400" rtl="0" eaLnBrk="1" fontAlgn="auto" latinLnBrk="0" hangingPunct="1">
+              <a:lnSpc>
+                <a:spcPct val="100000"/>
+              </a:lnSpc>
+              <a:spcBef>
+                <a:spcPts val="0"/>
+              </a:spcBef>
+              <a:spcAft>
+                <a:spcPts val="0"/>
+              </a:spcAft>
+              <a:buClrTx/>
+              <a:buSzTx/>
+              <a:buFontTx/>
+              <a:buNone/>
+              <a:tabLst/>
+              <a:defRPr/>
+            </a:pPr>
+            <a:r>
+              <a:rPr kumimoji="1" lang="ja-JP" altLang="en-US" dirty="0"/>
+              <a:t>薬が病気のタンパク質などに作用する化学反応の流れ</a:t>
+            </a:r>
+            <a:endParaRPr kumimoji="1" lang="en-US" altLang="ja-JP" dirty="0"/>
+          </a:p>
+          <a:p>
+            <a:r>
+              <a:rPr kumimoji="1" lang="ja-JP" altLang="en-US" dirty="0"/>
+              <a:t>例えば、抗うつ薬は、脳のセロトニンレベルに影響を与える選択的セロトニン再取り込み阻害剤（</a:t>
+            </a:r>
             <a:r>
               <a:rPr kumimoji="1" lang="en-US" altLang="ja-JP" dirty="0"/>
-              <a:t>https://www.kaggle.com/c/lish-moa/data</a:t>
+              <a:t>SSRI</a:t>
+            </a:r>
+            <a:r>
+              <a:rPr kumimoji="1" lang="ja-JP" altLang="en-US" dirty="0"/>
+              <a:t>）を持っている可能性があります</a:t>
+            </a:r>
+            <a:endParaRPr kumimoji="1" lang="en-US" altLang="ja-JP" dirty="0"/>
+          </a:p>
+          <a:p>
+            <a:r>
+              <a:rPr kumimoji="1" lang="en-US" altLang="ja-JP" dirty="0"/>
+              <a:t>https://www.kaggle.com/sinamhd9/me</a:t>
+            </a:r>
+          </a:p>
+          <a:p>
+            <a:endParaRPr kumimoji="1" lang="en-US" altLang="ja-JP" dirty="0"/>
+          </a:p>
+          <a:p>
+            <a:r>
+              <a:rPr kumimoji="1" lang="ja-JP" altLang="en-US" dirty="0"/>
+              <a:t>オプジーボは、</a:t>
+            </a:r>
+            <a:r>
+              <a:rPr kumimoji="1" lang="en-US" altLang="ja-JP" dirty="0"/>
+              <a:t>PD-1</a:t>
+            </a:r>
+            <a:r>
+              <a:rPr kumimoji="1" lang="ja-JP" altLang="en-US" dirty="0"/>
+              <a:t>と</a:t>
+            </a:r>
+            <a:r>
+              <a:rPr kumimoji="1" lang="en-US" altLang="ja-JP" dirty="0"/>
+              <a:t>PD-1</a:t>
+            </a:r>
+            <a:r>
+              <a:rPr kumimoji="1" lang="ja-JP" altLang="en-US" dirty="0"/>
+              <a:t>リガンド（</a:t>
+            </a:r>
+            <a:r>
+              <a:rPr kumimoji="1" lang="en-US" altLang="ja-JP" dirty="0"/>
+              <a:t>PD-L1</a:t>
+            </a:r>
+            <a:r>
+              <a:rPr kumimoji="1" lang="ja-JP" altLang="en-US" dirty="0"/>
+              <a:t>および</a:t>
+            </a:r>
+            <a:r>
+              <a:rPr kumimoji="1" lang="en-US" altLang="ja-JP" dirty="0"/>
+              <a:t>PD-L2</a:t>
+            </a:r>
+            <a:r>
+              <a:rPr kumimoji="1" lang="ja-JP" altLang="en-US" dirty="0"/>
+              <a:t>）との結合を阻害することで、がん細胞により不応答となっていた抗原特異的</a:t>
+            </a:r>
+            <a:r>
+              <a:rPr kumimoji="1" lang="en-US" altLang="ja-JP" dirty="0"/>
+              <a:t>T</a:t>
+            </a:r>
+            <a:r>
+              <a:rPr kumimoji="1" lang="ja-JP" altLang="en-US" dirty="0"/>
+              <a:t>細胞を回復・活性化させ、抗腫瘍効果を示す</a:t>
+            </a:r>
+          </a:p>
+          <a:p>
+            <a:r>
+              <a:rPr kumimoji="1" lang="en-US" altLang="ja-JP" dirty="0"/>
+              <a:t>https://www.opdivo.jp/basic-info/action/</a:t>
             </a:r>
             <a:endParaRPr kumimoji="1" lang="ja-JP" altLang="en-US" dirty="0"/>
           </a:p>
@@ -570,7 +664,7 @@
           <a:p>
             <a:fld id="{A398EE22-1D8E-4C5D-B5CD-DB0DE9C89355}" type="slidenum">
               <a:rPr kumimoji="1" lang="ja-JP" altLang="en-US" smtClean="0"/>
-              <a:t>3</a:t>
+              <a:t>2</a:t>
             </a:fld>
             <a:endParaRPr kumimoji="1" lang="ja-JP" altLang="en-US"/>
           </a:p>
@@ -579,7 +673,7 @@
     </p:spTree>
     <p:extLst>
       <p:ext uri="{BB962C8B-B14F-4D97-AF65-F5344CB8AC3E}">
-        <p14:creationId xmlns:p14="http://schemas.microsoft.com/office/powerpoint/2010/main" val="2431346452"/>
+        <p14:creationId xmlns:p14="http://schemas.microsoft.com/office/powerpoint/2010/main" val="1325434909"/>
       </p:ext>
     </p:extLst>
   </p:cSld>
@@ -635,6 +729,94 @@
           <a:p>
             <a:r>
               <a:rPr kumimoji="1" lang="en-US" altLang="ja-JP" dirty="0"/>
+              <a:t>https://www.kaggle.com/c/lish-moa/data</a:t>
+            </a:r>
+            <a:endParaRPr kumimoji="1" lang="ja-JP" altLang="en-US" dirty="0"/>
+          </a:p>
+        </p:txBody>
+      </p:sp>
+      <p:sp>
+        <p:nvSpPr>
+          <p:cNvPr id="4" name="スライド番号プレースホルダー 3"/>
+          <p:cNvSpPr>
+            <a:spLocks noGrp="1"/>
+          </p:cNvSpPr>
+          <p:nvPr>
+            <p:ph type="sldNum" sz="quarter" idx="5"/>
+          </p:nvPr>
+        </p:nvSpPr>
+        <p:spPr/>
+        <p:txBody>
+          <a:bodyPr/>
+          <a:lstStyle/>
+          <a:p>
+            <a:fld id="{A398EE22-1D8E-4C5D-B5CD-DB0DE9C89355}" type="slidenum">
+              <a:rPr kumimoji="1" lang="ja-JP" altLang="en-US" smtClean="0"/>
+              <a:t>3</a:t>
+            </a:fld>
+            <a:endParaRPr kumimoji="1" lang="ja-JP" altLang="en-US"/>
+          </a:p>
+        </p:txBody>
+      </p:sp>
+    </p:spTree>
+    <p:extLst>
+      <p:ext uri="{BB962C8B-B14F-4D97-AF65-F5344CB8AC3E}">
+        <p14:creationId xmlns:p14="http://schemas.microsoft.com/office/powerpoint/2010/main" val="2431346452"/>
+      </p:ext>
+    </p:extLst>
+  </p:cSld>
+  <p:clrMapOvr>
+    <a:masterClrMapping/>
+  </p:clrMapOvr>
+</p:notes>
+</file>
+
+<file path=ppt/notesSlides/notesSlide3.xml><?xml version="1.0" encoding="utf-8"?>
+<p:notes xmlns:a="http://schemas.openxmlformats.org/drawingml/2006/main" xmlns:r="http://schemas.openxmlformats.org/officeDocument/2006/relationships" xmlns:p="http://schemas.openxmlformats.org/presentationml/2006/main">
+  <p:cSld>
+    <p:spTree>
+      <p:nvGrpSpPr>
+        <p:cNvPr id="1" name=""/>
+        <p:cNvGrpSpPr/>
+        <p:nvPr/>
+      </p:nvGrpSpPr>
+      <p:grpSpPr>
+        <a:xfrm>
+          <a:off x="0" y="0"/>
+          <a:ext cx="0" cy="0"/>
+          <a:chOff x="0" y="0"/>
+          <a:chExt cx="0" cy="0"/>
+        </a:xfrm>
+      </p:grpSpPr>
+      <p:sp>
+        <p:nvSpPr>
+          <p:cNvPr id="2" name="スライド イメージ プレースホルダー 1"/>
+          <p:cNvSpPr>
+            <a:spLocks noGrp="1" noRot="1" noChangeAspect="1"/>
+          </p:cNvSpPr>
+          <p:nvPr>
+            <p:ph type="sldImg"/>
+          </p:nvPr>
+        </p:nvSpPr>
+        <p:spPr/>
+      </p:sp>
+      <p:sp>
+        <p:nvSpPr>
+          <p:cNvPr id="3" name="ノート プレースホルダー 2"/>
+          <p:cNvSpPr>
+            <a:spLocks noGrp="1"/>
+          </p:cNvSpPr>
+          <p:nvPr>
+            <p:ph type="body" idx="1"/>
+          </p:nvPr>
+        </p:nvSpPr>
+        <p:spPr/>
+        <p:txBody>
+          <a:bodyPr/>
+          <a:lstStyle/>
+          <a:p>
+            <a:r>
+              <a:rPr kumimoji="1" lang="en-US" altLang="ja-JP" dirty="0"/>
               <a:t>https://www.kaggle.com/c/lish-moa/discussion/193363</a:t>
             </a:r>
           </a:p>
@@ -662,9 +844,76 @@
           </a:p>
           <a:p>
             <a:r>
-              <a:rPr kumimoji="1" lang="en-US" altLang="ja-JP"/>
+              <a:rPr kumimoji="1" lang="en-US" altLang="ja-JP" dirty="0"/>
               <a:t>https://www.kaggle.com/c/lish-moa/discussion/193702</a:t>
             </a:r>
+          </a:p>
+          <a:p>
+            <a:endParaRPr kumimoji="1" lang="en-US" altLang="ja-JP" dirty="0"/>
+          </a:p>
+          <a:p>
+            <a:pPr>
+              <a:lnSpc>
+                <a:spcPct val="120000"/>
+              </a:lnSpc>
+            </a:pPr>
+            <a:r>
+              <a:rPr lang="ja-JP" altLang="en-US" sz="2400" b="0" i="0" dirty="0">
+                <a:latin typeface="游ゴシック 本文"/>
+              </a:rPr>
+              <a:t>薬の種類を識別する情報なし</a:t>
+            </a:r>
+            <a:endParaRPr lang="en-US" altLang="ja-JP" sz="2400" b="0" i="0" dirty="0">
+              <a:latin typeface="游ゴシック 本文"/>
+            </a:endParaRPr>
+          </a:p>
+          <a:p>
+            <a:pPr>
+              <a:lnSpc>
+                <a:spcPct val="120000"/>
+              </a:lnSpc>
+            </a:pPr>
+            <a:r>
+              <a:rPr lang="en-US" altLang="ja-JP" sz="2000" dirty="0" err="1">
+                <a:latin typeface="游ゴシック 本文"/>
+              </a:rPr>
+              <a:t>Kfold</a:t>
+            </a:r>
+            <a:r>
+              <a:rPr lang="ja-JP" altLang="en-US" sz="2000" dirty="0">
+                <a:latin typeface="游ゴシック 本文"/>
+              </a:rPr>
+              <a:t>で</a:t>
+            </a:r>
+            <a:r>
+              <a:rPr lang="en-US" altLang="ja-JP" sz="2000" dirty="0">
+                <a:latin typeface="游ゴシック 本文"/>
+              </a:rPr>
+              <a:t>CV</a:t>
+            </a:r>
+            <a:r>
+              <a:rPr lang="ja-JP" altLang="en-US" sz="2000" dirty="0">
+                <a:latin typeface="游ゴシック 本文"/>
+              </a:rPr>
+              <a:t>作ると同種の薬のデータが混じってリークする。薬の種類で</a:t>
+            </a:r>
+            <a:r>
+              <a:rPr lang="en-US" altLang="ja-JP" sz="2000" dirty="0" err="1">
+                <a:latin typeface="游ゴシック 本文"/>
+              </a:rPr>
+              <a:t>GroupKFold</a:t>
+            </a:r>
+            <a:r>
+              <a:rPr lang="ja-JP" altLang="en-US" sz="2000" dirty="0">
+                <a:latin typeface="游ゴシック 本文"/>
+              </a:rPr>
+              <a:t>したいができない</a:t>
+            </a:r>
+            <a:endParaRPr kumimoji="1" lang="en-US" altLang="ja-JP" sz="2000" dirty="0">
+              <a:latin typeface="游ゴシック 本文"/>
+            </a:endParaRPr>
+          </a:p>
+          <a:p>
             <a:endParaRPr kumimoji="1" lang="ja-JP" altLang="en-US" dirty="0"/>
           </a:p>
         </p:txBody>
@@ -705,7 +954,7 @@
 </p:notes>
 </file>
 
-<file path=ppt/notesSlides/notesSlide3.xml><?xml version="1.0" encoding="utf-8"?>
+<file path=ppt/notesSlides/notesSlide4.xml><?xml version="1.0" encoding="utf-8"?>
 <p:notes xmlns:a="http://schemas.openxmlformats.org/drawingml/2006/main" xmlns:r="http://schemas.openxmlformats.org/officeDocument/2006/relationships" xmlns:p="http://schemas.openxmlformats.org/presentationml/2006/main">
   <p:cSld>
     <p:spTree>
@@ -940,7 +1189,7 @@
           <a:p>
             <a:fld id="{DE38A0FA-1066-4405-A9B4-B20FDCFA17CE}" type="datetimeFigureOut">
               <a:rPr kumimoji="1" lang="ja-JP" altLang="en-US" smtClean="0"/>
-              <a:t>2020/10/30</a:t>
+              <a:t>2020/11/7</a:t>
             </a:fld>
             <a:endParaRPr kumimoji="1" lang="ja-JP" altLang="en-US"/>
           </a:p>
@@ -1170,7 +1419,7 @@
           <a:p>
             <a:fld id="{DE38A0FA-1066-4405-A9B4-B20FDCFA17CE}" type="datetimeFigureOut">
               <a:rPr kumimoji="1" lang="ja-JP" altLang="en-US" smtClean="0"/>
-              <a:t>2020/10/30</a:t>
+              <a:t>2020/11/7</a:t>
             </a:fld>
             <a:endParaRPr kumimoji="1" lang="ja-JP" altLang="en-US"/>
           </a:p>
@@ -1410,7 +1659,7 @@
           <a:p>
             <a:fld id="{DE38A0FA-1066-4405-A9B4-B20FDCFA17CE}" type="datetimeFigureOut">
               <a:rPr kumimoji="1" lang="ja-JP" altLang="en-US" smtClean="0"/>
-              <a:t>2020/10/30</a:t>
+              <a:t>2020/11/7</a:t>
             </a:fld>
             <a:endParaRPr kumimoji="1" lang="ja-JP" altLang="en-US"/>
           </a:p>
@@ -1640,7 +1889,7 @@
           <a:p>
             <a:fld id="{DE38A0FA-1066-4405-A9B4-B20FDCFA17CE}" type="datetimeFigureOut">
               <a:rPr kumimoji="1" lang="ja-JP" altLang="en-US" smtClean="0"/>
-              <a:t>2020/10/30</a:t>
+              <a:t>2020/11/7</a:t>
             </a:fld>
             <a:endParaRPr kumimoji="1" lang="ja-JP" altLang="en-US"/>
           </a:p>
@@ -1915,7 +2164,7 @@
           <a:p>
             <a:fld id="{DE38A0FA-1066-4405-A9B4-B20FDCFA17CE}" type="datetimeFigureOut">
               <a:rPr kumimoji="1" lang="ja-JP" altLang="en-US" smtClean="0"/>
-              <a:t>2020/10/30</a:t>
+              <a:t>2020/11/7</a:t>
             </a:fld>
             <a:endParaRPr kumimoji="1" lang="ja-JP" altLang="en-US"/>
           </a:p>
@@ -2244,7 +2493,7 @@
           <a:p>
             <a:fld id="{DE38A0FA-1066-4405-A9B4-B20FDCFA17CE}" type="datetimeFigureOut">
               <a:rPr kumimoji="1" lang="ja-JP" altLang="en-US" smtClean="0"/>
-              <a:t>2020/10/30</a:t>
+              <a:t>2020/11/7</a:t>
             </a:fld>
             <a:endParaRPr kumimoji="1" lang="ja-JP" altLang="en-US"/>
           </a:p>
@@ -2720,7 +2969,7 @@
           <a:p>
             <a:fld id="{DE38A0FA-1066-4405-A9B4-B20FDCFA17CE}" type="datetimeFigureOut">
               <a:rPr kumimoji="1" lang="ja-JP" altLang="en-US" smtClean="0"/>
-              <a:t>2020/10/30</a:t>
+              <a:t>2020/11/7</a:t>
             </a:fld>
             <a:endParaRPr kumimoji="1" lang="ja-JP" altLang="en-US"/>
           </a:p>
@@ -2861,7 +3110,7 @@
           <a:p>
             <a:fld id="{DE38A0FA-1066-4405-A9B4-B20FDCFA17CE}" type="datetimeFigureOut">
               <a:rPr kumimoji="1" lang="ja-JP" altLang="en-US" smtClean="0"/>
-              <a:t>2020/10/30</a:t>
+              <a:t>2020/11/7</a:t>
             </a:fld>
             <a:endParaRPr kumimoji="1" lang="ja-JP" altLang="en-US"/>
           </a:p>
@@ -2974,7 +3223,7 @@
           <a:p>
             <a:fld id="{DE38A0FA-1066-4405-A9B4-B20FDCFA17CE}" type="datetimeFigureOut">
               <a:rPr kumimoji="1" lang="ja-JP" altLang="en-US" smtClean="0"/>
-              <a:t>2020/10/30</a:t>
+              <a:t>2020/11/7</a:t>
             </a:fld>
             <a:endParaRPr kumimoji="1" lang="ja-JP" altLang="en-US"/>
           </a:p>
@@ -3317,7 +3566,7 @@
           <a:p>
             <a:fld id="{DE38A0FA-1066-4405-A9B4-B20FDCFA17CE}" type="datetimeFigureOut">
               <a:rPr kumimoji="1" lang="ja-JP" altLang="en-US" smtClean="0"/>
-              <a:t>2020/10/30</a:t>
+              <a:t>2020/11/7</a:t>
             </a:fld>
             <a:endParaRPr kumimoji="1" lang="ja-JP" altLang="en-US"/>
           </a:p>
@@ -3605,7 +3854,7 @@
           <a:p>
             <a:fld id="{DE38A0FA-1066-4405-A9B4-B20FDCFA17CE}" type="datetimeFigureOut">
               <a:rPr kumimoji="1" lang="ja-JP" altLang="en-US" smtClean="0"/>
-              <a:t>2020/10/30</a:t>
+              <a:t>2020/11/7</a:t>
             </a:fld>
             <a:endParaRPr kumimoji="1" lang="ja-JP" altLang="en-US"/>
           </a:p>
@@ -3878,7 +4127,7 @@
           <a:p>
             <a:fld id="{DE38A0FA-1066-4405-A9B4-B20FDCFA17CE}" type="datetimeFigureOut">
               <a:rPr kumimoji="1" lang="ja-JP" altLang="en-US" smtClean="0"/>
-              <a:t>2020/10/30</a:t>
+              <a:t>2020/11/7</a:t>
             </a:fld>
             <a:endParaRPr kumimoji="1" lang="ja-JP" altLang="en-US"/>
           </a:p>
@@ -4442,7 +4691,7 @@
         </p:spPr>
         <p:txBody>
           <a:bodyPr>
-            <a:normAutofit fontScale="92500" lnSpcReduction="20000"/>
+            <a:normAutofit fontScale="92500"/>
           </a:bodyPr>
           <a:lstStyle/>
           <a:p>
@@ -4515,7 +4764,7 @@
             </a:r>
             <a:r>
               <a:rPr kumimoji="1" lang="ja-JP" altLang="en-US" dirty="0"/>
-              <a:t>薬が病気のタンパク質などに作用する化学反応の流れ</a:t>
+              <a:t>薬物がその薬理作用を生み出す生化学的相互作用</a:t>
             </a:r>
             <a:endParaRPr kumimoji="1" lang="en-US" altLang="ja-JP" dirty="0"/>
           </a:p>
@@ -4531,152 +4780,29 @@
             </a:r>
             <a:r>
               <a:rPr kumimoji="1" lang="en-US" altLang="ja-JP" dirty="0"/>
-              <a:t>.</a:t>
-            </a:r>
-            <a:r>
-              <a:rPr lang="ja-JP" altLang="en-US" b="0" i="0" dirty="0">
-                <a:solidFill>
-                  <a:srgbClr val="333333"/>
-                </a:solidFill>
-                <a:effectLst/>
-                <a:latin typeface="-apple-system"/>
-              </a:rPr>
-              <a:t>オプジーボは、</a:t>
-            </a:r>
-            <a:r>
-              <a:rPr lang="en-US" altLang="ja-JP" b="0" i="0" dirty="0">
-                <a:solidFill>
-                  <a:srgbClr val="333333"/>
-                </a:solidFill>
-                <a:effectLst/>
-                <a:latin typeface="-apple-system"/>
-              </a:rPr>
-              <a:t>PD-1</a:t>
-            </a:r>
-            <a:r>
-              <a:rPr lang="ja-JP" altLang="en-US" b="0" i="0" dirty="0">
-                <a:solidFill>
-                  <a:srgbClr val="333333"/>
-                </a:solidFill>
-                <a:effectLst/>
-                <a:latin typeface="-apple-system"/>
-              </a:rPr>
-              <a:t>と</a:t>
-            </a:r>
-            <a:r>
-              <a:rPr lang="en-US" altLang="ja-JP" b="0" i="0" dirty="0">
-                <a:solidFill>
-                  <a:srgbClr val="333333"/>
-                </a:solidFill>
-                <a:effectLst/>
-                <a:latin typeface="-apple-system"/>
-              </a:rPr>
-              <a:t>PD-1</a:t>
-            </a:r>
-            <a:r>
-              <a:rPr lang="ja-JP" altLang="en-US" b="0" i="0" dirty="0">
-                <a:solidFill>
-                  <a:srgbClr val="333333"/>
-                </a:solidFill>
-                <a:effectLst/>
-                <a:latin typeface="-apple-system"/>
-              </a:rPr>
-              <a:t>リガンド（</a:t>
-            </a:r>
-            <a:r>
-              <a:rPr lang="en-US" altLang="ja-JP" b="0" i="0" dirty="0">
-                <a:solidFill>
-                  <a:srgbClr val="333333"/>
-                </a:solidFill>
-                <a:effectLst/>
-                <a:latin typeface="-apple-system"/>
-              </a:rPr>
-              <a:t>PD-L1</a:t>
-            </a:r>
-            <a:r>
-              <a:rPr lang="ja-JP" altLang="en-US" b="0" i="0" dirty="0">
-                <a:solidFill>
-                  <a:srgbClr val="333333"/>
-                </a:solidFill>
-                <a:effectLst/>
-                <a:latin typeface="-apple-system"/>
-              </a:rPr>
-              <a:t>および</a:t>
-            </a:r>
-            <a:r>
-              <a:rPr lang="en-US" altLang="ja-JP" b="0" i="0" dirty="0">
-                <a:solidFill>
-                  <a:srgbClr val="333333"/>
-                </a:solidFill>
-                <a:effectLst/>
-                <a:latin typeface="-apple-system"/>
-              </a:rPr>
-              <a:t>PD-L2</a:t>
-            </a:r>
-            <a:r>
-              <a:rPr lang="ja-JP" altLang="en-US" b="0" i="0" dirty="0">
-                <a:solidFill>
-                  <a:srgbClr val="333333"/>
-                </a:solidFill>
-                <a:effectLst/>
-                <a:latin typeface="-apple-system"/>
-              </a:rPr>
-              <a:t>）との結合を阻害することで、がん細胞により不応答となっていた抗原特異的</a:t>
-            </a:r>
-            <a:r>
-              <a:rPr lang="en-US" altLang="ja-JP" b="0" i="0" dirty="0">
-                <a:solidFill>
-                  <a:srgbClr val="333333"/>
-                </a:solidFill>
-                <a:effectLst/>
-                <a:latin typeface="-apple-system"/>
-              </a:rPr>
-              <a:t>T</a:t>
-            </a:r>
-            <a:r>
-              <a:rPr lang="ja-JP" altLang="en-US" b="0" i="0" dirty="0">
-                <a:solidFill>
-                  <a:srgbClr val="333333"/>
-                </a:solidFill>
-                <a:effectLst/>
-                <a:latin typeface="-apple-system"/>
-              </a:rPr>
-              <a:t>細胞を回復・活性化させ、抗腫瘍効果を示す</a:t>
-            </a:r>
-            <a:endParaRPr lang="en-US" altLang="ja-JP" b="0" i="0" dirty="0">
-              <a:solidFill>
-                <a:srgbClr val="333333"/>
-              </a:solidFill>
-              <a:effectLst/>
-              <a:latin typeface="-apple-system"/>
-            </a:endParaRPr>
-          </a:p>
-          <a:p>
-            <a:pPr lvl="2">
+              <a:t>. </a:t>
+            </a:r>
+            <a:r>
+              <a:rPr kumimoji="1" lang="ja-JP" altLang="en-US" dirty="0"/>
+              <a:t>抗うつ薬は、脳のセロトニンに影響を与える選択的セロトニン再取り込み阻害薬（</a:t>
+            </a:r>
+            <a:r>
+              <a:rPr kumimoji="1" lang="en-US" altLang="ja-JP" dirty="0"/>
+              <a:t>SSRI</a:t>
+            </a:r>
+            <a:r>
+              <a:rPr kumimoji="1" lang="ja-JP" altLang="en-US" dirty="0"/>
+              <a:t>）を持っている</a:t>
+            </a:r>
+            <a:endParaRPr kumimoji="1" lang="en-US" altLang="ja-JP" dirty="0"/>
+          </a:p>
+          <a:p>
+            <a:pPr>
               <a:lnSpc>
                 <a:spcPct val="110000"/>
               </a:lnSpc>
             </a:pPr>
-            <a:r>
-              <a:rPr kumimoji="1" lang="en-US" altLang="ja-JP" dirty="0">
-                <a:hlinkClick r:id="rId2"/>
-              </a:rPr>
-              <a:t>https://www.opdivo.jp/basic-info/action/</a:t>
-            </a:r>
-            <a:endParaRPr kumimoji="1" lang="en-US" altLang="ja-JP" dirty="0">
-              <a:solidFill>
-                <a:srgbClr val="333333"/>
-              </a:solidFill>
-              <a:latin typeface="-apple-system"/>
-            </a:endParaRPr>
-          </a:p>
-          <a:p>
-            <a:pPr lvl="2">
-              <a:lnSpc>
-                <a:spcPct val="110000"/>
-              </a:lnSpc>
-            </a:pPr>
-            <a:endParaRPr kumimoji="1" lang="en-US" altLang="ja-JP" dirty="0"/>
+            <a:endParaRPr lang="en-US" altLang="ja-JP" dirty="0"/>
           </a:p>
           <a:p>
             <a:pPr>
@@ -5585,8 +5711,8 @@
         </p:nvGrpSpPr>
         <p:grpSpPr>
           <a:xfrm>
-            <a:off x="1215280" y="4173793"/>
-            <a:ext cx="9846010" cy="2529805"/>
+            <a:off x="1215280" y="3429001"/>
+            <a:ext cx="9846010" cy="3274598"/>
             <a:chOff x="812700" y="2174409"/>
             <a:chExt cx="10705797" cy="3888744"/>
           </a:xfrm>
@@ -6100,7 +6226,7 @@
         </p:spPr>
         <p:txBody>
           <a:bodyPr>
-            <a:normAutofit lnSpcReduction="10000"/>
+            <a:normAutofit/>
           </a:bodyPr>
           <a:lstStyle/>
           <a:p>
@@ -6248,7 +6374,7 @@
               <a:t>cp_dose</a:t>
             </a:r>
             <a:r>
-              <a:rPr lang="ja-JP" altLang="en-US" sz="2000" b="0" i="0">
+              <a:rPr lang="ja-JP" altLang="en-US" sz="2000" b="0" i="0" dirty="0">
                 <a:latin typeface="游ゴシック 本文"/>
               </a:rPr>
               <a:t>列の組み合わせ</a:t>
@@ -6278,68 +6404,6 @@
               <a:t>行</a:t>
             </a:r>
             <a:endParaRPr lang="en-US" altLang="ja-JP" sz="2000" b="0" i="0" dirty="0">
-              <a:latin typeface="游ゴシック 本文"/>
-            </a:endParaRPr>
-          </a:p>
-          <a:p>
-            <a:pPr>
-              <a:lnSpc>
-                <a:spcPct val="120000"/>
-              </a:lnSpc>
-            </a:pPr>
-            <a:r>
-              <a:rPr lang="ja-JP" altLang="en-US" sz="2400" b="0" i="0" dirty="0">
-                <a:latin typeface="游ゴシック 本文"/>
-              </a:rPr>
-              <a:t>薬の種類を識別する情報なし</a:t>
-            </a:r>
-            <a:endParaRPr lang="en-US" altLang="ja-JP" sz="2400" b="0" i="0" dirty="0">
-              <a:latin typeface="游ゴシック 本文"/>
-            </a:endParaRPr>
-          </a:p>
-          <a:p>
-            <a:pPr lvl="1">
-              <a:lnSpc>
-                <a:spcPct val="120000"/>
-              </a:lnSpc>
-            </a:pPr>
-            <a:r>
-              <a:rPr lang="en-US" altLang="ja-JP" sz="2000" dirty="0" err="1">
-                <a:latin typeface="游ゴシック 本文"/>
-              </a:rPr>
-              <a:t>Kfold</a:t>
-            </a:r>
-            <a:r>
-              <a:rPr lang="ja-JP" altLang="en-US" sz="2000" dirty="0">
-                <a:latin typeface="游ゴシック 本文"/>
-              </a:rPr>
-              <a:t>で</a:t>
-            </a:r>
-            <a:r>
-              <a:rPr lang="en-US" altLang="ja-JP" sz="2000" dirty="0">
-                <a:latin typeface="游ゴシック 本文"/>
-              </a:rPr>
-              <a:t>CV</a:t>
-            </a:r>
-            <a:r>
-              <a:rPr lang="ja-JP" altLang="en-US" sz="2000" dirty="0">
-                <a:latin typeface="游ゴシック 本文"/>
-              </a:rPr>
-              <a:t>作ると同種の薬のデータが混じってリークする。薬の種類で</a:t>
-            </a:r>
-            <a:r>
-              <a:rPr lang="en-US" altLang="ja-JP" sz="2000" dirty="0" err="1">
-                <a:latin typeface="游ゴシック 本文"/>
-              </a:rPr>
-              <a:t>GroupKFold</a:t>
-            </a:r>
-            <a:r>
-              <a:rPr lang="ja-JP" altLang="en-US" sz="2000" dirty="0">
-                <a:latin typeface="游ゴシック 本文"/>
-              </a:rPr>
-              <a:t>したいができない</a:t>
-            </a:r>
-            <a:endParaRPr kumimoji="1" lang="en-US" altLang="ja-JP" sz="2000" dirty="0">
               <a:latin typeface="游ゴシック 本文"/>
             </a:endParaRPr>
           </a:p>

</xml_diff>

<commit_message>
add input from my_PC
</commit_message>
<xml_diff>
--- a/Kaggle_MoA.pptx
+++ b/Kaggle_MoA.pptx
@@ -202,7 +202,7 @@
           <a:p>
             <a:fld id="{20E8D8B0-DEC6-4D85-AF34-2CB4B66E100B}" type="datetimeFigureOut">
               <a:rPr kumimoji="1" lang="ja-JP" altLang="en-US" smtClean="0"/>
-              <a:t>2020/11/18</a:t>
+              <a:t>2020/11/27</a:t>
             </a:fld>
             <a:endParaRPr kumimoji="1" lang="ja-JP" altLang="en-US"/>
           </a:p>
@@ -1189,7 +1189,7 @@
           <a:p>
             <a:fld id="{DE38A0FA-1066-4405-A9B4-B20FDCFA17CE}" type="datetimeFigureOut">
               <a:rPr kumimoji="1" lang="ja-JP" altLang="en-US" smtClean="0"/>
-              <a:t>2020/11/18</a:t>
+              <a:t>2020/11/27</a:t>
             </a:fld>
             <a:endParaRPr kumimoji="1" lang="ja-JP" altLang="en-US"/>
           </a:p>
@@ -1419,7 +1419,7 @@
           <a:p>
             <a:fld id="{DE38A0FA-1066-4405-A9B4-B20FDCFA17CE}" type="datetimeFigureOut">
               <a:rPr kumimoji="1" lang="ja-JP" altLang="en-US" smtClean="0"/>
-              <a:t>2020/11/18</a:t>
+              <a:t>2020/11/27</a:t>
             </a:fld>
             <a:endParaRPr kumimoji="1" lang="ja-JP" altLang="en-US"/>
           </a:p>
@@ -1659,7 +1659,7 @@
           <a:p>
             <a:fld id="{DE38A0FA-1066-4405-A9B4-B20FDCFA17CE}" type="datetimeFigureOut">
               <a:rPr kumimoji="1" lang="ja-JP" altLang="en-US" smtClean="0"/>
-              <a:t>2020/11/18</a:t>
+              <a:t>2020/11/27</a:t>
             </a:fld>
             <a:endParaRPr kumimoji="1" lang="ja-JP" altLang="en-US"/>
           </a:p>
@@ -1889,7 +1889,7 @@
           <a:p>
             <a:fld id="{DE38A0FA-1066-4405-A9B4-B20FDCFA17CE}" type="datetimeFigureOut">
               <a:rPr kumimoji="1" lang="ja-JP" altLang="en-US" smtClean="0"/>
-              <a:t>2020/11/18</a:t>
+              <a:t>2020/11/27</a:t>
             </a:fld>
             <a:endParaRPr kumimoji="1" lang="ja-JP" altLang="en-US"/>
           </a:p>
@@ -2164,7 +2164,7 @@
           <a:p>
             <a:fld id="{DE38A0FA-1066-4405-A9B4-B20FDCFA17CE}" type="datetimeFigureOut">
               <a:rPr kumimoji="1" lang="ja-JP" altLang="en-US" smtClean="0"/>
-              <a:t>2020/11/18</a:t>
+              <a:t>2020/11/27</a:t>
             </a:fld>
             <a:endParaRPr kumimoji="1" lang="ja-JP" altLang="en-US"/>
           </a:p>
@@ -2493,7 +2493,7 @@
           <a:p>
             <a:fld id="{DE38A0FA-1066-4405-A9B4-B20FDCFA17CE}" type="datetimeFigureOut">
               <a:rPr kumimoji="1" lang="ja-JP" altLang="en-US" smtClean="0"/>
-              <a:t>2020/11/18</a:t>
+              <a:t>2020/11/27</a:t>
             </a:fld>
             <a:endParaRPr kumimoji="1" lang="ja-JP" altLang="en-US"/>
           </a:p>
@@ -2969,7 +2969,7 @@
           <a:p>
             <a:fld id="{DE38A0FA-1066-4405-A9B4-B20FDCFA17CE}" type="datetimeFigureOut">
               <a:rPr kumimoji="1" lang="ja-JP" altLang="en-US" smtClean="0"/>
-              <a:t>2020/11/18</a:t>
+              <a:t>2020/11/27</a:t>
             </a:fld>
             <a:endParaRPr kumimoji="1" lang="ja-JP" altLang="en-US"/>
           </a:p>
@@ -3110,7 +3110,7 @@
           <a:p>
             <a:fld id="{DE38A0FA-1066-4405-A9B4-B20FDCFA17CE}" type="datetimeFigureOut">
               <a:rPr kumimoji="1" lang="ja-JP" altLang="en-US" smtClean="0"/>
-              <a:t>2020/11/18</a:t>
+              <a:t>2020/11/27</a:t>
             </a:fld>
             <a:endParaRPr kumimoji="1" lang="ja-JP" altLang="en-US"/>
           </a:p>
@@ -3223,7 +3223,7 @@
           <a:p>
             <a:fld id="{DE38A0FA-1066-4405-A9B4-B20FDCFA17CE}" type="datetimeFigureOut">
               <a:rPr kumimoji="1" lang="ja-JP" altLang="en-US" smtClean="0"/>
-              <a:t>2020/11/18</a:t>
+              <a:t>2020/11/27</a:t>
             </a:fld>
             <a:endParaRPr kumimoji="1" lang="ja-JP" altLang="en-US"/>
           </a:p>
@@ -3566,7 +3566,7 @@
           <a:p>
             <a:fld id="{DE38A0FA-1066-4405-A9B4-B20FDCFA17CE}" type="datetimeFigureOut">
               <a:rPr kumimoji="1" lang="ja-JP" altLang="en-US" smtClean="0"/>
-              <a:t>2020/11/18</a:t>
+              <a:t>2020/11/27</a:t>
             </a:fld>
             <a:endParaRPr kumimoji="1" lang="ja-JP" altLang="en-US"/>
           </a:p>
@@ -3854,7 +3854,7 @@
           <a:p>
             <a:fld id="{DE38A0FA-1066-4405-A9B4-B20FDCFA17CE}" type="datetimeFigureOut">
               <a:rPr kumimoji="1" lang="ja-JP" altLang="en-US" smtClean="0"/>
-              <a:t>2020/11/18</a:t>
+              <a:t>2020/11/27</a:t>
             </a:fld>
             <a:endParaRPr kumimoji="1" lang="ja-JP" altLang="en-US"/>
           </a:p>
@@ -4127,7 +4127,7 @@
           <a:p>
             <a:fld id="{DE38A0FA-1066-4405-A9B4-B20FDCFA17CE}" type="datetimeFigureOut">
               <a:rPr kumimoji="1" lang="ja-JP" altLang="en-US" smtClean="0"/>
-              <a:t>2020/11/18</a:t>
+              <a:t>2020/11/27</a:t>
             </a:fld>
             <a:endParaRPr kumimoji="1" lang="ja-JP" altLang="en-US"/>
           </a:p>
@@ -4691,7 +4691,7 @@
         </p:spPr>
         <p:txBody>
           <a:bodyPr>
-            <a:normAutofit fontScale="92500"/>
+            <a:normAutofit fontScale="77500" lnSpcReduction="20000"/>
           </a:bodyPr>
           <a:lstStyle/>
           <a:p>
@@ -4708,39 +4708,35 @@
               <a:t>遺伝子発現値や細胞生存率から</a:t>
             </a:r>
             <a:r>
-              <a:rPr kumimoji="1" lang="ja-JP" altLang="en-US" b="1" dirty="0"/>
-              <a:t>薬の作用機序</a:t>
-            </a:r>
-            <a:r>
-              <a:rPr kumimoji="1" lang="en-US" altLang="ja-JP" b="1" dirty="0"/>
+              <a:rPr kumimoji="1" lang="ja-JP" altLang="en-US" dirty="0"/>
+              <a:t>薬（化合物）の作用機序</a:t>
+            </a:r>
+            <a:r>
+              <a:rPr kumimoji="1" lang="en-US" altLang="ja-JP" dirty="0"/>
               <a:t>(</a:t>
             </a:r>
             <a:r>
-              <a:rPr kumimoji="1" lang="en-US" altLang="ja-JP" b="1" dirty="0" err="1"/>
+              <a:rPr kumimoji="1" lang="en-US" altLang="ja-JP" dirty="0" err="1"/>
               <a:t>MoA</a:t>
             </a:r>
             <a:r>
-              <a:rPr kumimoji="1" lang="en-US" altLang="ja-JP" b="1" dirty="0"/>
+              <a:rPr kumimoji="1" lang="en-US" altLang="ja-JP" dirty="0"/>
               <a:t>)</a:t>
             </a:r>
             <a:r>
-              <a:rPr kumimoji="1" lang="ja-JP" altLang="en-US" b="1" dirty="0"/>
+              <a:rPr kumimoji="1" lang="ja-JP" altLang="en-US" dirty="0"/>
               <a:t>の</a:t>
             </a:r>
             <a:r>
-              <a:rPr lang="ja-JP" altLang="en-US" b="1" i="0" dirty="0">
+              <a:rPr lang="ja-JP" altLang="en-US" i="0" dirty="0">
                 <a:effectLst/>
                 <a:latin typeface="Inter"/>
               </a:rPr>
               <a:t>応答</a:t>
             </a:r>
             <a:r>
-              <a:rPr kumimoji="1" lang="ja-JP" altLang="en-US" b="1" dirty="0"/>
-              <a:t>を予測</a:t>
-            </a:r>
-            <a:r>
               <a:rPr kumimoji="1" lang="ja-JP" altLang="en-US" dirty="0"/>
-              <a:t>する</a:t>
+              <a:t>を予測する</a:t>
             </a:r>
             <a:endParaRPr kumimoji="1" lang="en-US" altLang="ja-JP" dirty="0"/>
           </a:p>
@@ -4800,17 +4796,53 @@
             </a:r>
             <a:r>
               <a:rPr kumimoji="1" lang="ja-JP" altLang="en-US" dirty="0"/>
-              <a:t>のような薬理作用が本コンペのクラスの</a:t>
+              <a:t>のような薬理作用の有り</a:t>
             </a:r>
             <a:r>
               <a:rPr kumimoji="1" lang="en-US" altLang="ja-JP" dirty="0"/>
-              <a:t>1</a:t>
+              <a:t>/</a:t>
             </a:r>
             <a:r>
               <a:rPr kumimoji="1" lang="ja-JP" altLang="en-US" dirty="0"/>
-              <a:t>つ</a:t>
+              <a:t>無し（</a:t>
+            </a:r>
+            <a:r>
+              <a:rPr kumimoji="1" lang="en-US" altLang="ja-JP" dirty="0"/>
+              <a:t>1/0</a:t>
+            </a:r>
+            <a:r>
+              <a:rPr kumimoji="1" lang="ja-JP" altLang="en-US" dirty="0"/>
+              <a:t>）が本コンペのクラス</a:t>
             </a:r>
             <a:endParaRPr kumimoji="1" lang="en-US" altLang="ja-JP" dirty="0"/>
+          </a:p>
+          <a:p>
+            <a:pPr>
+              <a:lnSpc>
+                <a:spcPct val="110000"/>
+              </a:lnSpc>
+            </a:pPr>
+            <a:endParaRPr lang="en-US" altLang="ja-JP" dirty="0"/>
+          </a:p>
+          <a:p>
+            <a:pPr>
+              <a:lnSpc>
+                <a:spcPct val="110000"/>
+              </a:lnSpc>
+            </a:pPr>
+            <a:r>
+              <a:rPr lang="ja-JP" altLang="en-US" dirty="0"/>
+              <a:t>新薬（化合物）の実験で得られた生物学的活性値から、その新薬には何の</a:t>
+            </a:r>
+            <a:r>
+              <a:rPr lang="en-US" altLang="ja-JP" dirty="0" err="1"/>
+              <a:t>MoA</a:t>
+            </a:r>
+            <a:r>
+              <a:rPr lang="ja-JP" altLang="en-US" dirty="0"/>
+              <a:t>があるかを予測でき、創薬支援につながる</a:t>
+            </a:r>
+            <a:endParaRPr lang="en-US" altLang="ja-JP" dirty="0"/>
           </a:p>
           <a:p>
             <a:pPr>

</xml_diff>

<commit_message>
add Competition_Review.txt from my_PC
</commit_message>
<xml_diff>
--- a/Kaggle_MoA.pptx
+++ b/Kaggle_MoA.pptx
@@ -202,7 +202,7 @@
           <a:p>
             <a:fld id="{20E8D8B0-DEC6-4D85-AF34-2CB4B66E100B}" type="datetimeFigureOut">
               <a:rPr kumimoji="1" lang="ja-JP" altLang="en-US" smtClean="0"/>
-              <a:t>2020/11/27</a:t>
+              <a:t>2020/12/1</a:t>
             </a:fld>
             <a:endParaRPr kumimoji="1" lang="ja-JP" altLang="en-US"/>
           </a:p>
@@ -643,6 +643,185 @@
               <a:rPr kumimoji="1" lang="en-US" altLang="ja-JP" dirty="0"/>
               <a:t>https://www.opdivo.jp/basic-info/action/</a:t>
             </a:r>
+          </a:p>
+          <a:p>
+            <a:endParaRPr kumimoji="1" lang="en-US" altLang="ja-JP" dirty="0"/>
+          </a:p>
+          <a:p>
+            <a:pPr marL="0" marR="0" lvl="0" indent="0" algn="l" defTabSz="914400" rtl="0" eaLnBrk="1" fontAlgn="auto" latinLnBrk="0" hangingPunct="1">
+              <a:lnSpc>
+                <a:spcPct val="100000"/>
+              </a:lnSpc>
+              <a:spcBef>
+                <a:spcPts val="0"/>
+              </a:spcBef>
+              <a:spcAft>
+                <a:spcPts val="0"/>
+              </a:spcAft>
+              <a:buClrTx/>
+              <a:buSzTx/>
+              <a:buFontTx/>
+              <a:buNone/>
+              <a:tabLst/>
+              <a:defRPr/>
+            </a:pPr>
+            <a:r>
+              <a:rPr lang="ja-JP" altLang="en-US" b="0" i="0" dirty="0">
+                <a:effectLst/>
+                <a:latin typeface="Inter"/>
+              </a:rPr>
+              <a:t>遺伝子発現値や細胞生存率から</a:t>
+            </a:r>
+            <a:r>
+              <a:rPr kumimoji="1" lang="ja-JP" altLang="en-US" dirty="0"/>
+              <a:t>薬（化合物）の作用機序</a:t>
+            </a:r>
+            <a:r>
+              <a:rPr kumimoji="1" lang="en-US" altLang="ja-JP" dirty="0"/>
+              <a:t>(</a:t>
+            </a:r>
+            <a:r>
+              <a:rPr kumimoji="1" lang="en-US" altLang="ja-JP" dirty="0" err="1"/>
+              <a:t>MoA</a:t>
+            </a:r>
+            <a:r>
+              <a:rPr kumimoji="1" lang="en-US" altLang="ja-JP" dirty="0"/>
+              <a:t>)</a:t>
+            </a:r>
+            <a:r>
+              <a:rPr kumimoji="1" lang="ja-JP" altLang="en-US" dirty="0"/>
+              <a:t>の</a:t>
+            </a:r>
+            <a:r>
+              <a:rPr lang="ja-JP" altLang="en-US" i="0" dirty="0">
+                <a:effectLst/>
+                <a:latin typeface="Inter"/>
+              </a:rPr>
+              <a:t>応答</a:t>
+            </a:r>
+            <a:r>
+              <a:rPr kumimoji="1" lang="ja-JP" altLang="en-US" dirty="0"/>
+              <a:t>を予測する</a:t>
+            </a:r>
+            <a:endParaRPr kumimoji="1" lang="en-US" altLang="ja-JP" dirty="0"/>
+          </a:p>
+          <a:p>
+            <a:pPr marL="0" marR="0" lvl="0" indent="0" algn="l" defTabSz="914400" rtl="0" eaLnBrk="1" fontAlgn="auto" latinLnBrk="0" hangingPunct="1">
+              <a:lnSpc>
+                <a:spcPct val="100000"/>
+              </a:lnSpc>
+              <a:spcBef>
+                <a:spcPts val="0"/>
+              </a:spcBef>
+              <a:spcAft>
+                <a:spcPts val="0"/>
+              </a:spcAft>
+              <a:buClrTx/>
+              <a:buSzTx/>
+              <a:buFontTx/>
+              <a:buNone/>
+              <a:tabLst/>
+              <a:defRPr/>
+            </a:pPr>
+            <a:endParaRPr kumimoji="1" lang="en-US" altLang="ja-JP" dirty="0"/>
+          </a:p>
+          <a:p>
+            <a:pPr marL="0" marR="0" lvl="0" indent="0" algn="l" defTabSz="914400" rtl="0" eaLnBrk="1" fontAlgn="auto" latinLnBrk="0" hangingPunct="1">
+              <a:lnSpc>
+                <a:spcPct val="100000"/>
+              </a:lnSpc>
+              <a:spcBef>
+                <a:spcPts val="0"/>
+              </a:spcBef>
+              <a:spcAft>
+                <a:spcPts val="0"/>
+              </a:spcAft>
+              <a:buClrTx/>
+              <a:buSzTx/>
+              <a:buFontTx/>
+              <a:buNone/>
+              <a:tabLst/>
+              <a:defRPr/>
+            </a:pPr>
+            <a:r>
+              <a:rPr lang="ja-JP" altLang="en-US" sz="1200" spc="100" dirty="0"/>
+              <a:t>新薬（化合物）の実験で得られた生物学的活性値から、その新薬には何の</a:t>
+            </a:r>
+            <a:r>
+              <a:rPr lang="en-US" altLang="ja-JP" sz="1200" spc="100" dirty="0" err="1"/>
+              <a:t>MoA</a:t>
+            </a:r>
+            <a:r>
+              <a:rPr lang="ja-JP" altLang="en-US" sz="1200" spc="100" dirty="0"/>
+              <a:t>があるかを予測でき、創薬支援につながる</a:t>
+            </a:r>
+            <a:endParaRPr lang="en-US" altLang="ja-JP" sz="1200" spc="100" dirty="0"/>
+          </a:p>
+          <a:p>
+            <a:pPr marL="0" marR="0" lvl="0" indent="0" algn="l" defTabSz="914400" rtl="0" eaLnBrk="1" fontAlgn="auto" latinLnBrk="0" hangingPunct="1">
+              <a:lnSpc>
+                <a:spcPct val="100000"/>
+              </a:lnSpc>
+              <a:spcBef>
+                <a:spcPts val="0"/>
+              </a:spcBef>
+              <a:spcAft>
+                <a:spcPts val="0"/>
+              </a:spcAft>
+              <a:buClrTx/>
+              <a:buSzTx/>
+              <a:buFontTx/>
+              <a:buNone/>
+              <a:tabLst/>
+              <a:defRPr/>
+            </a:pPr>
+            <a:endParaRPr kumimoji="1" lang="en-US" altLang="ja-JP" dirty="0"/>
+          </a:p>
+          <a:p>
+            <a:pPr marL="0" marR="0" lvl="0" indent="0" algn="l" defTabSz="914400" rtl="0" eaLnBrk="1" fontAlgn="auto" latinLnBrk="0" hangingPunct="1">
+              <a:lnSpc>
+                <a:spcPct val="100000"/>
+              </a:lnSpc>
+              <a:spcBef>
+                <a:spcPts val="0"/>
+              </a:spcBef>
+              <a:spcAft>
+                <a:spcPts val="0"/>
+              </a:spcAft>
+              <a:buClrTx/>
+              <a:buSzTx/>
+              <a:buFontTx/>
+              <a:buNone/>
+              <a:tabLst/>
+              <a:defRPr/>
+            </a:pPr>
+            <a:endParaRPr kumimoji="1" lang="en-US" altLang="ja-JP" dirty="0"/>
+          </a:p>
+          <a:p>
+            <a:pPr marL="0" marR="0" lvl="0" indent="0" algn="l" defTabSz="914400" rtl="0" eaLnBrk="1" fontAlgn="auto" latinLnBrk="0" hangingPunct="1">
+              <a:lnSpc>
+                <a:spcPct val="100000"/>
+              </a:lnSpc>
+              <a:spcBef>
+                <a:spcPts val="0"/>
+              </a:spcBef>
+              <a:spcAft>
+                <a:spcPts val="0"/>
+              </a:spcAft>
+              <a:buClrTx/>
+              <a:buSzTx/>
+              <a:buFontTx/>
+              <a:buNone/>
+              <a:tabLst/>
+              <a:defRPr/>
+            </a:pPr>
+            <a:r>
+              <a:rPr kumimoji="1" lang="ja-JP" altLang="en-US" dirty="0"/>
+              <a:t>薬物がその</a:t>
+            </a:r>
+            <a:endParaRPr kumimoji="1" lang="en-US" altLang="ja-JP" dirty="0"/>
+          </a:p>
+          <a:p>
             <a:endParaRPr kumimoji="1" lang="ja-JP" altLang="en-US" dirty="0"/>
           </a:p>
         </p:txBody>
@@ -1189,7 +1368,7 @@
           <a:p>
             <a:fld id="{DE38A0FA-1066-4405-A9B4-B20FDCFA17CE}" type="datetimeFigureOut">
               <a:rPr kumimoji="1" lang="ja-JP" altLang="en-US" smtClean="0"/>
-              <a:t>2020/11/27</a:t>
+              <a:t>2020/12/1</a:t>
             </a:fld>
             <a:endParaRPr kumimoji="1" lang="ja-JP" altLang="en-US"/>
           </a:p>
@@ -1419,7 +1598,7 @@
           <a:p>
             <a:fld id="{DE38A0FA-1066-4405-A9B4-B20FDCFA17CE}" type="datetimeFigureOut">
               <a:rPr kumimoji="1" lang="ja-JP" altLang="en-US" smtClean="0"/>
-              <a:t>2020/11/27</a:t>
+              <a:t>2020/12/1</a:t>
             </a:fld>
             <a:endParaRPr kumimoji="1" lang="ja-JP" altLang="en-US"/>
           </a:p>
@@ -1659,7 +1838,7 @@
           <a:p>
             <a:fld id="{DE38A0FA-1066-4405-A9B4-B20FDCFA17CE}" type="datetimeFigureOut">
               <a:rPr kumimoji="1" lang="ja-JP" altLang="en-US" smtClean="0"/>
-              <a:t>2020/11/27</a:t>
+              <a:t>2020/12/1</a:t>
             </a:fld>
             <a:endParaRPr kumimoji="1" lang="ja-JP" altLang="en-US"/>
           </a:p>
@@ -1889,7 +2068,7 @@
           <a:p>
             <a:fld id="{DE38A0FA-1066-4405-A9B4-B20FDCFA17CE}" type="datetimeFigureOut">
               <a:rPr kumimoji="1" lang="ja-JP" altLang="en-US" smtClean="0"/>
-              <a:t>2020/11/27</a:t>
+              <a:t>2020/12/1</a:t>
             </a:fld>
             <a:endParaRPr kumimoji="1" lang="ja-JP" altLang="en-US"/>
           </a:p>
@@ -2164,7 +2343,7 @@
           <a:p>
             <a:fld id="{DE38A0FA-1066-4405-A9B4-B20FDCFA17CE}" type="datetimeFigureOut">
               <a:rPr kumimoji="1" lang="ja-JP" altLang="en-US" smtClean="0"/>
-              <a:t>2020/11/27</a:t>
+              <a:t>2020/12/1</a:t>
             </a:fld>
             <a:endParaRPr kumimoji="1" lang="ja-JP" altLang="en-US"/>
           </a:p>
@@ -2493,7 +2672,7 @@
           <a:p>
             <a:fld id="{DE38A0FA-1066-4405-A9B4-B20FDCFA17CE}" type="datetimeFigureOut">
               <a:rPr kumimoji="1" lang="ja-JP" altLang="en-US" smtClean="0"/>
-              <a:t>2020/11/27</a:t>
+              <a:t>2020/12/1</a:t>
             </a:fld>
             <a:endParaRPr kumimoji="1" lang="ja-JP" altLang="en-US"/>
           </a:p>
@@ -2969,7 +3148,7 @@
           <a:p>
             <a:fld id="{DE38A0FA-1066-4405-A9B4-B20FDCFA17CE}" type="datetimeFigureOut">
               <a:rPr kumimoji="1" lang="ja-JP" altLang="en-US" smtClean="0"/>
-              <a:t>2020/11/27</a:t>
+              <a:t>2020/12/1</a:t>
             </a:fld>
             <a:endParaRPr kumimoji="1" lang="ja-JP" altLang="en-US"/>
           </a:p>
@@ -3110,7 +3289,7 @@
           <a:p>
             <a:fld id="{DE38A0FA-1066-4405-A9B4-B20FDCFA17CE}" type="datetimeFigureOut">
               <a:rPr kumimoji="1" lang="ja-JP" altLang="en-US" smtClean="0"/>
-              <a:t>2020/11/27</a:t>
+              <a:t>2020/12/1</a:t>
             </a:fld>
             <a:endParaRPr kumimoji="1" lang="ja-JP" altLang="en-US"/>
           </a:p>
@@ -3223,7 +3402,7 @@
           <a:p>
             <a:fld id="{DE38A0FA-1066-4405-A9B4-B20FDCFA17CE}" type="datetimeFigureOut">
               <a:rPr kumimoji="1" lang="ja-JP" altLang="en-US" smtClean="0"/>
-              <a:t>2020/11/27</a:t>
+              <a:t>2020/12/1</a:t>
             </a:fld>
             <a:endParaRPr kumimoji="1" lang="ja-JP" altLang="en-US"/>
           </a:p>
@@ -3566,7 +3745,7 @@
           <a:p>
             <a:fld id="{DE38A0FA-1066-4405-A9B4-B20FDCFA17CE}" type="datetimeFigureOut">
               <a:rPr kumimoji="1" lang="ja-JP" altLang="en-US" smtClean="0"/>
-              <a:t>2020/11/27</a:t>
+              <a:t>2020/12/1</a:t>
             </a:fld>
             <a:endParaRPr kumimoji="1" lang="ja-JP" altLang="en-US"/>
           </a:p>
@@ -3854,7 +4033,7 @@
           <a:p>
             <a:fld id="{DE38A0FA-1066-4405-A9B4-B20FDCFA17CE}" type="datetimeFigureOut">
               <a:rPr kumimoji="1" lang="ja-JP" altLang="en-US" smtClean="0"/>
-              <a:t>2020/11/27</a:t>
+              <a:t>2020/12/1</a:t>
             </a:fld>
             <a:endParaRPr kumimoji="1" lang="ja-JP" altLang="en-US"/>
           </a:p>
@@ -4127,7 +4306,7 @@
           <a:p>
             <a:fld id="{DE38A0FA-1066-4405-A9B4-B20FDCFA17CE}" type="datetimeFigureOut">
               <a:rPr kumimoji="1" lang="ja-JP" altLang="en-US" smtClean="0"/>
-              <a:t>2020/11/27</a:t>
+              <a:t>2020/12/1</a:t>
             </a:fld>
             <a:endParaRPr kumimoji="1" lang="ja-JP" altLang="en-US"/>
           </a:p>
@@ -4650,7 +4829,7 @@
         </p:nvSpPr>
         <p:spPr>
           <a:xfrm>
-            <a:off x="261257" y="84914"/>
+            <a:off x="440547" y="156630"/>
             <a:ext cx="11092543" cy="888488"/>
           </a:xfrm>
         </p:spPr>
@@ -4685,280 +4864,413 @@
         </p:nvSpPr>
         <p:spPr>
           <a:xfrm>
-            <a:off x="261257" y="1120877"/>
-            <a:ext cx="11092543" cy="5574890"/>
+            <a:off x="519953" y="1272989"/>
+            <a:ext cx="10833847" cy="5351061"/>
           </a:xfrm>
         </p:spPr>
         <p:txBody>
           <a:bodyPr>
-            <a:normAutofit fontScale="77500" lnSpcReduction="20000"/>
+            <a:noAutofit/>
           </a:bodyPr>
           <a:lstStyle/>
           <a:p>
-            <a:pPr>
+            <a:pPr marL="0" indent="0">
               <a:lnSpc>
-                <a:spcPct val="110000"/>
+                <a:spcPct val="100000"/>
               </a:lnSpc>
+              <a:spcBef>
+                <a:spcPts val="600"/>
+              </a:spcBef>
+              <a:buClr>
+                <a:schemeClr val="accent5"/>
+              </a:buClr>
+              <a:buNone/>
             </a:pPr>
             <a:r>
-              <a:rPr lang="ja-JP" altLang="en-US" b="0" i="0" dirty="0">
+              <a:rPr lang="ja-JP" altLang="en-US" sz="2400" b="1" i="0" spc="100" dirty="0">
+                <a:solidFill>
+                  <a:srgbClr val="24292E"/>
+                </a:solidFill>
+                <a:effectLst/>
+                <a:latin typeface="-apple-system"/>
+              </a:rPr>
+              <a:t>薬の作用機序</a:t>
+            </a:r>
+            <a:r>
+              <a:rPr lang="en-US" altLang="ja-JP" sz="2400" b="1" i="0" spc="100" dirty="0">
+                <a:solidFill>
+                  <a:srgbClr val="24292E"/>
+                </a:solidFill>
+                <a:effectLst/>
+                <a:latin typeface="-apple-system"/>
+              </a:rPr>
+              <a:t>(</a:t>
+            </a:r>
+            <a:r>
+              <a:rPr lang="en-US" altLang="ja-JP" sz="2400" b="1" i="0" spc="100" dirty="0" err="1">
+                <a:solidFill>
+                  <a:srgbClr val="24292E"/>
+                </a:solidFill>
+                <a:effectLst/>
+                <a:latin typeface="-apple-system"/>
+              </a:rPr>
+              <a:t>MoA</a:t>
+            </a:r>
+            <a:r>
+              <a:rPr lang="en-US" altLang="ja-JP" sz="2400" b="1" i="0" spc="100" dirty="0">
+                <a:solidFill>
+                  <a:srgbClr val="24292E"/>
+                </a:solidFill>
+                <a:effectLst/>
+                <a:latin typeface="-apple-system"/>
+              </a:rPr>
+              <a:t>)</a:t>
+            </a:r>
+            <a:r>
+              <a:rPr lang="ja-JP" altLang="en-US" sz="2400" b="1" i="0" spc="100" dirty="0">
+                <a:solidFill>
+                  <a:srgbClr val="24292E"/>
+                </a:solidFill>
+                <a:effectLst/>
+                <a:latin typeface="-apple-system"/>
+              </a:rPr>
+              <a:t>の応答を予測する</a:t>
+            </a:r>
+            <a:endParaRPr lang="en-US" altLang="ja-JP" sz="2400" b="1" spc="100" dirty="0">
+              <a:solidFill>
+                <a:srgbClr val="24292E"/>
+              </a:solidFill>
+              <a:latin typeface="Inter"/>
+            </a:endParaRPr>
+          </a:p>
+          <a:p>
+            <a:pPr indent="-360000">
+              <a:lnSpc>
+                <a:spcPct val="100000"/>
+              </a:lnSpc>
+              <a:spcBef>
+                <a:spcPts val="600"/>
+              </a:spcBef>
+              <a:buClr>
+                <a:schemeClr val="accent5"/>
+              </a:buClr>
+              <a:buFont typeface="Wingdings" panose="05000000000000000000" pitchFamily="2" charset="2"/>
+              <a:buChar char="l"/>
+            </a:pPr>
+            <a:r>
+              <a:rPr kumimoji="1" lang="en-US" altLang="ja-JP" sz="2000" spc="100" dirty="0" err="1"/>
+              <a:t>MoA</a:t>
+            </a:r>
+            <a:r>
+              <a:rPr lang="en-US" altLang="ja-JP" sz="2000" spc="100" dirty="0"/>
+              <a:t>(</a:t>
+            </a:r>
+            <a:r>
+              <a:rPr kumimoji="1" lang="en-US" altLang="ja-JP" sz="2000" spc="100" dirty="0"/>
+              <a:t>mechanism of action): </a:t>
+            </a:r>
+            <a:r>
+              <a:rPr kumimoji="1" lang="ja-JP" altLang="en-US" sz="2000" spc="100" dirty="0"/>
+              <a:t>薬理作用を生み出す生化学的相互作用</a:t>
+            </a:r>
+            <a:endParaRPr lang="en-US" altLang="ja-JP" sz="2000" spc="100" dirty="0"/>
+          </a:p>
+          <a:p>
+            <a:pPr indent="-360000">
+              <a:lnSpc>
+                <a:spcPct val="100000"/>
+              </a:lnSpc>
+              <a:spcBef>
+                <a:spcPts val="600"/>
+              </a:spcBef>
+              <a:buClr>
+                <a:schemeClr val="accent5"/>
+              </a:buClr>
+              <a:buFont typeface="Wingdings" panose="05000000000000000000" pitchFamily="2" charset="2"/>
+              <a:buChar char="l"/>
+            </a:pPr>
+            <a:r>
+              <a:rPr kumimoji="1" lang="ja-JP" altLang="en-US" sz="2000" spc="100" dirty="0"/>
+              <a:t>抗うつ薬は、脳のセロトニンに影響を与える選択的セロトニン再取り込み阻害薬（</a:t>
+            </a:r>
+            <a:r>
+              <a:rPr kumimoji="1" lang="en-US" altLang="ja-JP" sz="2000" spc="100" dirty="0"/>
+              <a:t>SSRI</a:t>
+            </a:r>
+            <a:r>
+              <a:rPr kumimoji="1" lang="ja-JP" altLang="en-US" sz="2000" spc="100" dirty="0"/>
+              <a:t>）を持っている</a:t>
+            </a:r>
+            <a:endParaRPr lang="en-US" altLang="ja-JP" sz="2000" spc="100" dirty="0"/>
+          </a:p>
+          <a:p>
+            <a:pPr indent="-360000">
+              <a:lnSpc>
+                <a:spcPct val="100000"/>
+              </a:lnSpc>
+              <a:spcBef>
+                <a:spcPts val="600"/>
+              </a:spcBef>
+              <a:buClr>
+                <a:schemeClr val="accent5"/>
+              </a:buClr>
+              <a:buFont typeface="Wingdings" panose="05000000000000000000" pitchFamily="2" charset="2"/>
+              <a:buChar char="l"/>
+            </a:pPr>
+            <a:r>
+              <a:rPr kumimoji="1" lang="en-US" altLang="ja-JP" sz="2000" spc="100" dirty="0"/>
+              <a:t>SSRI</a:t>
+            </a:r>
+            <a:r>
+              <a:rPr kumimoji="1" lang="ja-JP" altLang="en-US" sz="2000" spc="100" dirty="0"/>
+              <a:t>のような薬理作用の有り</a:t>
+            </a:r>
+            <a:r>
+              <a:rPr kumimoji="1" lang="en-US" altLang="ja-JP" sz="2000" spc="100" dirty="0"/>
+              <a:t>/</a:t>
+            </a:r>
+            <a:r>
+              <a:rPr kumimoji="1" lang="ja-JP" altLang="en-US" sz="2000" spc="100" dirty="0"/>
+              <a:t>無し</a:t>
+            </a:r>
+            <a:r>
+              <a:rPr kumimoji="1" lang="en-US" altLang="ja-JP" sz="2000" spc="100" dirty="0"/>
+              <a:t>(1/0</a:t>
+            </a:r>
+            <a:r>
+              <a:rPr lang="en-US" altLang="ja-JP" sz="2000" spc="100" dirty="0"/>
+              <a:t>)</a:t>
+            </a:r>
+            <a:r>
+              <a:rPr kumimoji="1" lang="ja-JP" altLang="en-US" sz="2000" spc="100" dirty="0"/>
+              <a:t>が本コンペのクラス</a:t>
+            </a:r>
+            <a:endParaRPr lang="en-US" altLang="ja-JP" sz="2000" spc="100" dirty="0"/>
+          </a:p>
+          <a:p>
+            <a:pPr marL="0" indent="0">
+              <a:lnSpc>
+                <a:spcPct val="100000"/>
+              </a:lnSpc>
+              <a:spcBef>
+                <a:spcPts val="600"/>
+              </a:spcBef>
+              <a:buClr>
+                <a:schemeClr val="accent5"/>
+              </a:buClr>
+              <a:buNone/>
+            </a:pPr>
+            <a:endParaRPr lang="en-US" altLang="ja-JP" sz="2400" spc="100" dirty="0"/>
+          </a:p>
+          <a:p>
+            <a:pPr marL="0" indent="0">
+              <a:lnSpc>
+                <a:spcPct val="100000"/>
+              </a:lnSpc>
+              <a:spcBef>
+                <a:spcPts val="600"/>
+              </a:spcBef>
+              <a:buClr>
+                <a:schemeClr val="accent5"/>
+              </a:buClr>
+              <a:buNone/>
+            </a:pPr>
+            <a:r>
+              <a:rPr kumimoji="1" lang="ja-JP" altLang="en-US" sz="2400" b="1" spc="100" dirty="0"/>
+              <a:t>マルチラベル分類問題</a:t>
+            </a:r>
+            <a:endParaRPr kumimoji="1" lang="en-US" altLang="ja-JP" sz="2400" b="1" spc="100" dirty="0"/>
+          </a:p>
+          <a:p>
+            <a:pPr indent="-360000">
+              <a:lnSpc>
+                <a:spcPct val="100000"/>
+              </a:lnSpc>
+              <a:spcBef>
+                <a:spcPts val="600"/>
+              </a:spcBef>
+              <a:buClr>
+                <a:schemeClr val="accent5"/>
+              </a:buClr>
+              <a:buFont typeface="Wingdings" panose="05000000000000000000" pitchFamily="2" charset="2"/>
+              <a:buChar char="l"/>
+            </a:pPr>
+            <a:r>
+              <a:rPr lang="ja-JP" altLang="en-US" sz="2000" b="0" i="0">
                 <a:effectLst/>
                 <a:latin typeface="Inter"/>
               </a:rPr>
-              <a:t>遺伝子発現値や細胞生存率から</a:t>
-            </a:r>
-            <a:r>
-              <a:rPr kumimoji="1" lang="ja-JP" altLang="en-US" dirty="0"/>
-              <a:t>薬（化合物）の作用機序</a:t>
-            </a:r>
-            <a:r>
-              <a:rPr kumimoji="1" lang="en-US" altLang="ja-JP" dirty="0"/>
-              <a:t>(</a:t>
-            </a:r>
-            <a:r>
-              <a:rPr kumimoji="1" lang="en-US" altLang="ja-JP" dirty="0" err="1"/>
-              <a:t>MoA</a:t>
-            </a:r>
-            <a:r>
-              <a:rPr kumimoji="1" lang="en-US" altLang="ja-JP" dirty="0"/>
-              <a:t>)</a:t>
-            </a:r>
-            <a:r>
-              <a:rPr kumimoji="1" lang="ja-JP" altLang="en-US" dirty="0"/>
-              <a:t>の</a:t>
-            </a:r>
-            <a:r>
-              <a:rPr lang="ja-JP" altLang="en-US" i="0" dirty="0">
+              <a:t>ラベルは非常</a:t>
+            </a:r>
+            <a:r>
+              <a:rPr lang="ja-JP" altLang="en-US" sz="2000" b="0" i="0" dirty="0">
                 <a:effectLst/>
                 <a:latin typeface="Inter"/>
               </a:rPr>
-              <a:t>応答</a:t>
-            </a:r>
-            <a:r>
-              <a:rPr kumimoji="1" lang="ja-JP" altLang="en-US" dirty="0"/>
-              <a:t>を予測する</a:t>
-            </a:r>
-            <a:endParaRPr kumimoji="1" lang="en-US" altLang="ja-JP" dirty="0"/>
-          </a:p>
-          <a:p>
-            <a:pPr lvl="1">
+              <a:t>に不均衡（</a:t>
+            </a:r>
+            <a:r>
+              <a:rPr lang="en-US" altLang="ja-JP" sz="2000" b="0" i="0" dirty="0">
+                <a:effectLst/>
+                <a:latin typeface="Inter"/>
+              </a:rPr>
+              <a:t>0</a:t>
+            </a:r>
+            <a:r>
+              <a:rPr lang="ja-JP" altLang="en-US" sz="2000" b="0" i="0" dirty="0">
+                <a:effectLst/>
+                <a:latin typeface="Inter"/>
+              </a:rPr>
+              <a:t>のラベルが大半で</a:t>
+            </a:r>
+            <a:r>
+              <a:rPr lang="en-US" altLang="ja-JP" sz="2000" b="0" i="0" dirty="0">
+                <a:effectLst/>
+                <a:latin typeface="Inter"/>
+              </a:rPr>
+              <a:t>1</a:t>
+            </a:r>
+            <a:r>
+              <a:rPr lang="ja-JP" altLang="en-US" sz="2000" b="0" i="0" dirty="0">
+                <a:effectLst/>
+                <a:latin typeface="Inter"/>
+              </a:rPr>
+              <a:t>のラベルが非常に少ない）</a:t>
+            </a:r>
+            <a:endParaRPr kumimoji="1" lang="en-US" altLang="ja-JP" sz="2000" dirty="0"/>
+          </a:p>
+          <a:p>
+            <a:pPr marL="0" indent="0">
               <a:lnSpc>
-                <a:spcPct val="110000"/>
+                <a:spcPct val="100000"/>
               </a:lnSpc>
+              <a:spcBef>
+                <a:spcPts val="600"/>
+              </a:spcBef>
+              <a:buClr>
+                <a:schemeClr val="accent5"/>
+              </a:buClr>
+              <a:buNone/>
             </a:pPr>
-            <a:r>
-              <a:rPr kumimoji="1" lang="en-US" altLang="ja-JP" dirty="0" err="1"/>
-              <a:t>MoA</a:t>
-            </a:r>
-            <a:r>
-              <a:rPr lang="en-US" altLang="ja-JP" dirty="0"/>
-              <a:t>(</a:t>
-            </a:r>
-            <a:r>
-              <a:rPr kumimoji="1" lang="en-US" altLang="ja-JP" dirty="0"/>
-              <a:t>mechanism of action): </a:t>
-            </a:r>
-            <a:r>
-              <a:rPr kumimoji="1" lang="ja-JP" altLang="en-US" dirty="0"/>
-              <a:t>薬物がその薬理作用を生み出す生化学的相互作用</a:t>
-            </a:r>
-            <a:endParaRPr kumimoji="1" lang="en-US" altLang="ja-JP" dirty="0"/>
-          </a:p>
-          <a:p>
-            <a:pPr lvl="2">
+            <a:endParaRPr lang="en-US" altLang="ja-JP" sz="2400" spc="100" dirty="0"/>
+          </a:p>
+          <a:p>
+            <a:pPr marL="0" indent="0">
               <a:lnSpc>
-                <a:spcPct val="110000"/>
+                <a:spcPct val="100000"/>
               </a:lnSpc>
+              <a:spcBef>
+                <a:spcPts val="600"/>
+              </a:spcBef>
+              <a:buClr>
+                <a:schemeClr val="accent5"/>
+              </a:buClr>
+              <a:buNone/>
             </a:pPr>
             <a:r>
-              <a:rPr kumimoji="1" lang="ja-JP" altLang="en-US" dirty="0"/>
-              <a:t>抗うつ薬は、脳のセロトニンに影響を与える選択的セロトニン再取り込み阻害薬（</a:t>
-            </a:r>
-            <a:r>
-              <a:rPr kumimoji="1" lang="en-US" altLang="ja-JP" dirty="0"/>
-              <a:t>SSRI</a:t>
-            </a:r>
-            <a:r>
-              <a:rPr kumimoji="1" lang="ja-JP" altLang="en-US" dirty="0"/>
-              <a:t>）を持っている</a:t>
-            </a:r>
-            <a:endParaRPr kumimoji="1" lang="en-US" altLang="ja-JP" dirty="0"/>
-          </a:p>
-          <a:p>
-            <a:pPr lvl="2">
+              <a:rPr lang="ja-JP" altLang="en-US" sz="2400" b="1" spc="100" dirty="0"/>
+              <a:t>テーブルデータ</a:t>
+            </a:r>
+            <a:endParaRPr lang="en-US" altLang="ja-JP" sz="2400" b="1" spc="100" dirty="0"/>
+          </a:p>
+          <a:p>
+            <a:pPr indent="-360000">
               <a:lnSpc>
-                <a:spcPct val="110000"/>
+                <a:spcPct val="100000"/>
               </a:lnSpc>
+              <a:spcBef>
+                <a:spcPts val="600"/>
+              </a:spcBef>
+              <a:buClr>
+                <a:schemeClr val="accent5"/>
+              </a:buClr>
+              <a:buFont typeface="Wingdings" panose="05000000000000000000" pitchFamily="2" charset="2"/>
+              <a:buChar char="l"/>
             </a:pPr>
             <a:r>
-              <a:rPr kumimoji="1" lang="en-US" altLang="ja-JP" dirty="0"/>
-              <a:t>SSRI</a:t>
-            </a:r>
-            <a:r>
-              <a:rPr kumimoji="1" lang="ja-JP" altLang="en-US" dirty="0"/>
-              <a:t>のような薬理作用の有り</a:t>
-            </a:r>
-            <a:r>
-              <a:rPr kumimoji="1" lang="en-US" altLang="ja-JP" dirty="0"/>
-              <a:t>/</a:t>
-            </a:r>
-            <a:r>
-              <a:rPr kumimoji="1" lang="ja-JP" altLang="en-US" dirty="0"/>
-              <a:t>無し（</a:t>
-            </a:r>
-            <a:r>
-              <a:rPr kumimoji="1" lang="en-US" altLang="ja-JP" dirty="0"/>
-              <a:t>1/0</a:t>
-            </a:r>
-            <a:r>
-              <a:rPr kumimoji="1" lang="ja-JP" altLang="en-US" dirty="0"/>
-              <a:t>）が本コンペのクラス</a:t>
-            </a:r>
-            <a:endParaRPr kumimoji="1" lang="en-US" altLang="ja-JP" dirty="0"/>
-          </a:p>
-          <a:p>
-            <a:pPr>
+              <a:rPr lang="en-US" altLang="ja-JP" sz="2000" spc="100" dirty="0"/>
+              <a:t>train data: 23,814</a:t>
+            </a:r>
+            <a:r>
+              <a:rPr lang="ja-JP" altLang="en-US" sz="2000" spc="100" dirty="0"/>
+              <a:t>行、</a:t>
+            </a:r>
+            <a:r>
+              <a:rPr lang="en-US" altLang="ja-JP" sz="2000" spc="100" dirty="0"/>
+              <a:t>public test data: 3,982</a:t>
+            </a:r>
+            <a:r>
+              <a:rPr lang="ja-JP" altLang="en-US" sz="2000" spc="100" dirty="0"/>
+              <a:t>行</a:t>
+            </a:r>
+            <a:endParaRPr lang="en-US" altLang="ja-JP" sz="2000" spc="100" dirty="0"/>
+          </a:p>
+          <a:p>
+            <a:pPr indent="-360000">
               <a:lnSpc>
-                <a:spcPct val="110000"/>
+                <a:spcPct val="100000"/>
               </a:lnSpc>
+              <a:spcBef>
+                <a:spcPts val="600"/>
+              </a:spcBef>
+              <a:buClr>
+                <a:schemeClr val="accent5"/>
+              </a:buClr>
+              <a:buFont typeface="Wingdings" panose="05000000000000000000" pitchFamily="2" charset="2"/>
+              <a:buChar char="l"/>
             </a:pPr>
-            <a:endParaRPr lang="en-US" altLang="ja-JP" dirty="0"/>
-          </a:p>
-          <a:p>
-            <a:pPr>
+            <a:r>
+              <a:rPr lang="en-US" altLang="ja-JP" sz="2000" spc="100" dirty="0"/>
+              <a:t>private test data</a:t>
+            </a:r>
+            <a:r>
+              <a:rPr lang="ja-JP" altLang="en-US" sz="2000" spc="100" dirty="0"/>
+              <a:t>は</a:t>
+            </a:r>
+            <a:r>
+              <a:rPr lang="en-US" altLang="ja-JP" sz="2000" spc="100" dirty="0"/>
+              <a:t>public</a:t>
+            </a:r>
+            <a:r>
+              <a:rPr lang="ja-JP" altLang="en-US" sz="2000" spc="100" dirty="0"/>
+              <a:t>の</a:t>
+            </a:r>
+            <a:r>
+              <a:rPr lang="en-US" altLang="ja-JP" sz="2000" spc="100" dirty="0"/>
+              <a:t>4</a:t>
+            </a:r>
+            <a:r>
+              <a:rPr lang="ja-JP" altLang="en-US" sz="2000" spc="100" dirty="0"/>
+              <a:t>倍。</a:t>
+            </a:r>
+            <a:r>
+              <a:rPr lang="ja-JP" altLang="en-US" sz="1800" spc="100" dirty="0"/>
+              <a:t>コンペ終了後</a:t>
+            </a:r>
+            <a:r>
+              <a:rPr lang="en-US" altLang="ja-JP" sz="1800" spc="100" dirty="0"/>
+              <a:t>private test set</a:t>
+            </a:r>
+            <a:r>
+              <a:rPr lang="ja-JP" altLang="en-US" sz="1800" spc="100" dirty="0"/>
+              <a:t>追加されて順位決まる</a:t>
+            </a:r>
+            <a:endParaRPr lang="en-US" altLang="ja-JP" sz="1800" spc="100" dirty="0"/>
+          </a:p>
+          <a:p>
+            <a:pPr marL="0" indent="0">
               <a:lnSpc>
-                <a:spcPct val="110000"/>
+                <a:spcPct val="100000"/>
               </a:lnSpc>
+              <a:spcBef>
+                <a:spcPts val="600"/>
+              </a:spcBef>
+              <a:buClr>
+                <a:schemeClr val="accent5"/>
+              </a:buClr>
+              <a:buNone/>
             </a:pPr>
-            <a:r>
-              <a:rPr lang="ja-JP" altLang="en-US" dirty="0"/>
-              <a:t>新薬（化合物）の実験で得られた生物学的活性値から、その新薬には何の</a:t>
-            </a:r>
-            <a:r>
-              <a:rPr lang="en-US" altLang="ja-JP" dirty="0" err="1"/>
-              <a:t>MoA</a:t>
-            </a:r>
-            <a:r>
-              <a:rPr lang="ja-JP" altLang="en-US" dirty="0"/>
-              <a:t>があるかを予測でき、創薬支援につながる</a:t>
-            </a:r>
-            <a:endParaRPr lang="en-US" altLang="ja-JP" dirty="0"/>
-          </a:p>
-          <a:p>
-            <a:pPr>
-              <a:lnSpc>
-                <a:spcPct val="110000"/>
-              </a:lnSpc>
-            </a:pPr>
-            <a:endParaRPr lang="en-US" altLang="ja-JP" dirty="0"/>
-          </a:p>
-          <a:p>
-            <a:pPr>
-              <a:lnSpc>
-                <a:spcPct val="110000"/>
-              </a:lnSpc>
-            </a:pPr>
-            <a:r>
-              <a:rPr lang="ja-JP" altLang="en-US" dirty="0"/>
-              <a:t>テーブルコンペ</a:t>
-            </a:r>
-            <a:endParaRPr lang="en-US" altLang="ja-JP" dirty="0"/>
-          </a:p>
-          <a:p>
-            <a:pPr lvl="1">
-              <a:lnSpc>
-                <a:spcPct val="110000"/>
-              </a:lnSpc>
-            </a:pPr>
-            <a:r>
-              <a:rPr lang="en-US" altLang="ja-JP" dirty="0"/>
-              <a:t>train data: 23,814</a:t>
-            </a:r>
-            <a:r>
-              <a:rPr lang="ja-JP" altLang="en-US" dirty="0"/>
-              <a:t>行、</a:t>
-            </a:r>
-            <a:r>
-              <a:rPr lang="en-US" altLang="ja-JP" dirty="0"/>
-              <a:t>public test data: 3,982</a:t>
-            </a:r>
-            <a:r>
-              <a:rPr lang="ja-JP" altLang="en-US" dirty="0"/>
-              <a:t>行</a:t>
-            </a:r>
-            <a:endParaRPr lang="en-US" altLang="ja-JP" dirty="0"/>
-          </a:p>
-          <a:p>
-            <a:pPr lvl="1">
-              <a:lnSpc>
-                <a:spcPct val="110000"/>
-              </a:lnSpc>
-            </a:pPr>
-            <a:r>
-              <a:rPr lang="en-US" altLang="ja-JP" dirty="0"/>
-              <a:t>private test data</a:t>
-            </a:r>
-            <a:r>
-              <a:rPr lang="ja-JP" altLang="en-US" dirty="0"/>
-              <a:t>は</a:t>
-            </a:r>
-            <a:r>
-              <a:rPr lang="en-US" altLang="ja-JP" dirty="0"/>
-              <a:t>public</a:t>
-            </a:r>
-            <a:r>
-              <a:rPr lang="ja-JP" altLang="en-US" dirty="0"/>
-              <a:t>の</a:t>
-            </a:r>
-            <a:r>
-              <a:rPr lang="en-US" altLang="ja-JP" dirty="0"/>
-              <a:t>4</a:t>
-            </a:r>
-            <a:r>
-              <a:rPr lang="ja-JP" altLang="en-US" dirty="0"/>
-              <a:t>倍</a:t>
-            </a:r>
-            <a:endParaRPr lang="en-US" altLang="ja-JP" dirty="0"/>
-          </a:p>
-          <a:p>
-            <a:pPr lvl="2">
-              <a:lnSpc>
-                <a:spcPct val="110000"/>
-              </a:lnSpc>
-            </a:pPr>
-            <a:r>
-              <a:rPr lang="ja-JP" altLang="en-US" dirty="0"/>
-              <a:t>コンペ終了後</a:t>
-            </a:r>
-            <a:r>
-              <a:rPr lang="en-US" altLang="ja-JP" dirty="0"/>
-              <a:t>private test set</a:t>
-            </a:r>
-            <a:r>
-              <a:rPr lang="ja-JP" altLang="en-US" dirty="0"/>
-              <a:t>追加されて順位決まる</a:t>
-            </a:r>
-            <a:endParaRPr lang="en-US" altLang="ja-JP" dirty="0"/>
-          </a:p>
-          <a:p>
-            <a:pPr>
-              <a:lnSpc>
-                <a:spcPct val="110000"/>
-              </a:lnSpc>
-            </a:pPr>
-            <a:endParaRPr lang="en-US" altLang="ja-JP" dirty="0"/>
-          </a:p>
-          <a:p>
-            <a:pPr>
-              <a:lnSpc>
-                <a:spcPct val="110000"/>
-              </a:lnSpc>
-            </a:pPr>
-            <a:r>
-              <a:rPr kumimoji="1" lang="ja-JP" altLang="en-US" dirty="0"/>
-              <a:t>マルチラベル分類問題</a:t>
-            </a:r>
-            <a:endParaRPr kumimoji="1" lang="en-US" altLang="ja-JP" dirty="0"/>
+            <a:endParaRPr kumimoji="1" lang="en-US" altLang="ja-JP" sz="2400" spc="100" dirty="0"/>
           </a:p>
         </p:txBody>
       </p:sp>
@@ -4984,8 +5296,8 @@
         </p:blipFill>
         <p:spPr>
           <a:xfrm>
-            <a:off x="7730009" y="84914"/>
-            <a:ext cx="4200734" cy="888488"/>
+            <a:off x="6759388" y="84914"/>
+            <a:ext cx="5171355" cy="888488"/>
           </a:xfrm>
           <a:prstGeom prst="rect">
             <a:avLst/>
@@ -5058,51 +5370,6 @@
           </a:p>
         </p:txBody>
       </p:sp>
-      <p:sp>
-        <p:nvSpPr>
-          <p:cNvPr id="3" name="コンテンツ プレースホルダー 2">
-            <a:extLst>
-              <a:ext uri="{FF2B5EF4-FFF2-40B4-BE49-F238E27FC236}">
-                <a16:creationId xmlns:a16="http://schemas.microsoft.com/office/drawing/2014/main" id="{7EF4750E-39A8-42FE-AEAA-01E439CBA84B}"/>
-              </a:ext>
-            </a:extLst>
-          </p:cNvPr>
-          <p:cNvSpPr>
-            <a:spLocks noGrp="1"/>
-          </p:cNvSpPr>
-          <p:nvPr>
-            <p:ph idx="1"/>
-          </p:nvPr>
-        </p:nvSpPr>
-        <p:spPr>
-          <a:xfrm>
-            <a:off x="261257" y="1120877"/>
-            <a:ext cx="11092543" cy="545692"/>
-          </a:xfrm>
-        </p:spPr>
-        <p:txBody>
-          <a:bodyPr>
-            <a:normAutofit/>
-          </a:bodyPr>
-          <a:lstStyle/>
-          <a:p>
-            <a:pPr>
-              <a:lnSpc>
-                <a:spcPct val="110000"/>
-              </a:lnSpc>
-            </a:pPr>
-            <a:r>
-              <a:rPr kumimoji="1" lang="en-US" altLang="ja-JP" dirty="0"/>
-              <a:t>5</a:t>
-            </a:r>
-            <a:r>
-              <a:rPr kumimoji="1" lang="ja-JP" altLang="en-US" dirty="0"/>
-              <a:t>ファイル</a:t>
-            </a:r>
-            <a:endParaRPr kumimoji="1" lang="en-US" altLang="ja-JP" dirty="0"/>
-          </a:p>
-        </p:txBody>
-      </p:sp>
       <p:graphicFrame>
         <p:nvGraphicFramePr>
           <p:cNvPr id="4" name="表 3">
@@ -5118,14 +5385,14 @@
           <p:nvPr>
             <p:extLst>
               <p:ext uri="{D42A27DB-BD31-4B8C-83A1-F6EECF244321}">
-                <p14:modId xmlns:p14="http://schemas.microsoft.com/office/powerpoint/2010/main" val="121383942"/>
+                <p14:modId xmlns:p14="http://schemas.microsoft.com/office/powerpoint/2010/main" val="519764240"/>
               </p:ext>
             </p:extLst>
           </p:nvPr>
         </p:nvGraphicFramePr>
         <p:xfrm>
-          <a:off x="549058" y="1814043"/>
-          <a:ext cx="11097350" cy="4425393"/>
+          <a:off x="549058" y="1255059"/>
+          <a:ext cx="11097350" cy="4984378"/>
         </p:xfrm>
         <a:graphic>
           <a:graphicData uri="http://schemas.openxmlformats.org/drawingml/2006/table">
@@ -5156,7 +5423,7 @@
                   </a:extLst>
                 </a:gridCol>
               </a:tblGrid>
-              <a:tr h="632199">
+              <a:tr h="712054">
                 <a:tc>
                   <a:txBody>
                     <a:bodyPr/>
@@ -5235,7 +5502,7 @@
                   </a:ext>
                 </a:extLst>
               </a:tr>
-              <a:tr h="632199">
+              <a:tr h="712054">
                 <a:tc>
                   <a:txBody>
                     <a:bodyPr/>
@@ -5320,7 +5587,7 @@
                   </a:ext>
                 </a:extLst>
               </a:tr>
-              <a:tr h="632199">
+              <a:tr h="712054">
                 <a:tc>
                   <a:txBody>
                     <a:bodyPr/>
@@ -5405,7 +5672,7 @@
                   </a:ext>
                 </a:extLst>
               </a:tr>
-              <a:tr h="632199">
+              <a:tr h="712054">
                 <a:tc>
                   <a:txBody>
                     <a:bodyPr/>
@@ -5484,7 +5751,7 @@
                   </a:ext>
                 </a:extLst>
               </a:tr>
-              <a:tr h="632199">
+              <a:tr h="712054">
                 <a:tc>
                   <a:txBody>
                     <a:bodyPr/>
@@ -5584,7 +5851,7 @@
                   </a:ext>
                 </a:extLst>
               </a:tr>
-              <a:tr h="632199">
+              <a:tr h="712054">
                 <a:tc>
                   <a:txBody>
                     <a:bodyPr/>
@@ -5663,7 +5930,7 @@
                   </a:ext>
                 </a:extLst>
               </a:tr>
-              <a:tr h="632199">
+              <a:tr h="712054">
                 <a:tc>
                   <a:txBody>
                     <a:bodyPr/>
@@ -5851,10 +6118,10 @@
         </p:nvGrpSpPr>
         <p:grpSpPr>
           <a:xfrm>
-            <a:off x="1215280" y="3429001"/>
-            <a:ext cx="9846010" cy="3274598"/>
-            <a:chOff x="812700" y="2174409"/>
-            <a:chExt cx="10705797" cy="3888744"/>
+            <a:off x="420147" y="3431153"/>
+            <a:ext cx="10641143" cy="3272447"/>
+            <a:chOff x="-51869" y="2176964"/>
+            <a:chExt cx="11570366" cy="3886189"/>
           </a:xfrm>
         </p:grpSpPr>
         <p:pic>
@@ -5901,13 +6168,13 @@
           </p:nvSpPr>
           <p:spPr>
             <a:xfrm>
-              <a:off x="1332278" y="2213018"/>
+              <a:off x="-51869" y="2596270"/>
               <a:ext cx="1219201" cy="542852"/>
             </a:xfrm>
             <a:prstGeom prst="wedgeRectCallout">
               <a:avLst>
-                <a:gd name="adj1" fmla="val -41967"/>
-                <a:gd name="adj2" fmla="val 132884"/>
+                <a:gd name="adj1" fmla="val 50775"/>
+                <a:gd name="adj2" fmla="val 93661"/>
               </a:avLst>
             </a:prstGeom>
           </p:spPr>
@@ -6045,13 +6312,13 @@
           </p:nvSpPr>
           <p:spPr>
             <a:xfrm>
-              <a:off x="2739213" y="2174409"/>
+              <a:off x="2703400" y="2443148"/>
               <a:ext cx="2900523" cy="620067"/>
             </a:xfrm>
             <a:prstGeom prst="wedgeRectCallout">
               <a:avLst>
-                <a:gd name="adj1" fmla="val -38073"/>
-                <a:gd name="adj2" fmla="val 123474"/>
+                <a:gd name="adj1" fmla="val -18581"/>
+                <a:gd name="adj2" fmla="val 96003"/>
               </a:avLst>
             </a:prstGeom>
           </p:spPr>
@@ -6189,13 +6456,13 @@
           </p:nvSpPr>
           <p:spPr>
             <a:xfrm>
-              <a:off x="6356556" y="2176964"/>
-              <a:ext cx="2900524" cy="857057"/>
+              <a:off x="6830402" y="2176964"/>
+              <a:ext cx="2705437" cy="857057"/>
             </a:xfrm>
             <a:prstGeom prst="wedgeRectCallout">
               <a:avLst>
-                <a:gd name="adj1" fmla="val -78053"/>
-                <a:gd name="adj2" fmla="val 149902"/>
+                <a:gd name="adj1" fmla="val -68685"/>
+                <a:gd name="adj2" fmla="val 90278"/>
               </a:avLst>
             </a:prstGeom>
           </p:spPr>
@@ -6360,8 +6627,8 @@
         </p:nvSpPr>
         <p:spPr>
           <a:xfrm>
-            <a:off x="261257" y="999726"/>
-            <a:ext cx="11625943" cy="3174066"/>
+            <a:off x="297116" y="999726"/>
+            <a:ext cx="11464578" cy="3174066"/>
           </a:xfrm>
         </p:spPr>
         <p:txBody>
@@ -6370,38 +6637,65 @@
           </a:bodyPr>
           <a:lstStyle/>
           <a:p>
-            <a:pPr>
+            <a:pPr marL="0" indent="0">
               <a:lnSpc>
-                <a:spcPct val="120000"/>
+                <a:spcPct val="100000"/>
               </a:lnSpc>
+              <a:buNone/>
             </a:pPr>
             <a:r>
-              <a:rPr lang="ja-JP" altLang="en-US" sz="2400" dirty="0">
+              <a:rPr lang="ja-JP" altLang="en-US" sz="2400" b="1" dirty="0">
                 <a:latin typeface="游ゴシック 本文"/>
               </a:rPr>
               <a:t>約</a:t>
             </a:r>
             <a:r>
-              <a:rPr lang="en-US" altLang="ja-JP" sz="2400" dirty="0">
+              <a:rPr lang="en-US" altLang="ja-JP" sz="2400" b="1" dirty="0">
                 <a:latin typeface="游ゴシック 本文"/>
               </a:rPr>
               <a:t>5,000</a:t>
             </a:r>
             <a:r>
-              <a:rPr lang="ja-JP" altLang="en-US" sz="2400" dirty="0">
+              <a:rPr lang="ja-JP" altLang="en-US" sz="2400" b="1" dirty="0">
                 <a:latin typeface="游ゴシック 本文"/>
               </a:rPr>
               <a:t>種類の薬を使った実験データ</a:t>
             </a:r>
-            <a:endParaRPr lang="en-US" altLang="ja-JP" sz="2400" dirty="0">
+            <a:endParaRPr lang="en-US" altLang="ja-JP" sz="2400" b="1" dirty="0">
               <a:latin typeface="游ゴシック 本文"/>
             </a:endParaRPr>
           </a:p>
           <a:p>
-            <a:pPr lvl="1">
+            <a:pPr marL="360000" indent="-360000">
               <a:lnSpc>
-                <a:spcPct val="120000"/>
+                <a:spcPct val="100000"/>
               </a:lnSpc>
+              <a:buClr>
+                <a:schemeClr val="accent5"/>
+              </a:buClr>
+              <a:buFont typeface="Wingdings" panose="05000000000000000000" pitchFamily="2" charset="2"/>
+              <a:buChar char="l"/>
+            </a:pPr>
+            <a:r>
+              <a:rPr lang="ja-JP" altLang="en-US" sz="2000" dirty="0">
+                <a:latin typeface="游ゴシック 本文"/>
+              </a:rPr>
+              <a:t>遺伝子発現値や細胞生存率</a:t>
+            </a:r>
+            <a:endParaRPr lang="en-US" altLang="ja-JP" sz="2000" dirty="0">
+              <a:latin typeface="游ゴシック 本文"/>
+            </a:endParaRPr>
+          </a:p>
+          <a:p>
+            <a:pPr marL="360000" indent="-360000">
+              <a:lnSpc>
+                <a:spcPct val="100000"/>
+              </a:lnSpc>
+              <a:buClr>
+                <a:schemeClr val="accent5"/>
+              </a:buClr>
+              <a:buFont typeface="Wingdings" panose="05000000000000000000" pitchFamily="2" charset="2"/>
+              <a:buChar char="l"/>
             </a:pPr>
             <a:r>
               <a:rPr lang="en-US" altLang="ja-JP" sz="2000" dirty="0">
@@ -6432,44 +6726,50 @@
             </a:endParaRPr>
           </a:p>
           <a:p>
-            <a:pPr>
+            <a:pPr marL="0" indent="0">
               <a:lnSpc>
-                <a:spcPct val="120000"/>
+                <a:spcPct val="100000"/>
               </a:lnSpc>
+              <a:buNone/>
             </a:pPr>
             <a:r>
-              <a:rPr lang="en-US" altLang="ja-JP" sz="2400" b="0" i="0" dirty="0">
+              <a:rPr lang="en-US" altLang="ja-JP" sz="2400" b="1" i="0" dirty="0">
                 <a:latin typeface="游ゴシック 本文"/>
               </a:rPr>
               <a:t>1</a:t>
             </a:r>
             <a:r>
-              <a:rPr lang="ja-JP" altLang="en-US" sz="2400" b="0" i="0" dirty="0">
+              <a:rPr lang="ja-JP" altLang="en-US" sz="2400" b="1" i="0" dirty="0">
                 <a:latin typeface="游ゴシック 本文"/>
               </a:rPr>
               <a:t>つの薬について</a:t>
             </a:r>
             <a:r>
-              <a:rPr lang="en-US" altLang="ja-JP" sz="2400" dirty="0">
+              <a:rPr lang="en-US" altLang="ja-JP" sz="2400" b="1" dirty="0">
                 <a:latin typeface="游ゴシック 本文"/>
               </a:rPr>
               <a:t>6*n</a:t>
             </a:r>
             <a:r>
-              <a:rPr lang="ja-JP" altLang="en-US" sz="2400" b="0" i="0" dirty="0">
+              <a:rPr lang="ja-JP" altLang="en-US" sz="2400" b="1" i="0" dirty="0">
                 <a:latin typeface="游ゴシック 本文"/>
               </a:rPr>
               <a:t>行ある</a:t>
             </a:r>
-            <a:endParaRPr lang="en-US" altLang="ja-JP" sz="2400" b="0" i="0" dirty="0">
+            <a:endParaRPr lang="en-US" altLang="ja-JP" sz="2400" b="1" dirty="0">
               <a:latin typeface="游ゴシック 本文"/>
             </a:endParaRPr>
           </a:p>
           <a:p>
-            <a:pPr lvl="1">
+            <a:pPr marL="360000" indent="-360000">
               <a:lnSpc>
-                <a:spcPct val="120000"/>
+                <a:spcPct val="100000"/>
               </a:lnSpc>
+              <a:buClr>
+                <a:schemeClr val="accent5"/>
+              </a:buClr>
+              <a:buFont typeface="Wingdings" panose="05000000000000000000" pitchFamily="2" charset="2"/>
+              <a:buChar char="l"/>
             </a:pPr>
             <a:r>
               <a:rPr lang="en-US" altLang="ja-JP" sz="2000" b="0" i="0" dirty="0">
@@ -6527,10 +6827,15 @@
             </a:r>
           </a:p>
           <a:p>
-            <a:pPr lvl="1">
+            <a:pPr marL="360000" indent="-360000">
               <a:lnSpc>
-                <a:spcPct val="120000"/>
+                <a:spcPct val="100000"/>
               </a:lnSpc>
+              <a:buClr>
+                <a:schemeClr val="accent5"/>
+              </a:buClr>
+              <a:buFont typeface="Wingdings" panose="05000000000000000000" pitchFamily="2" charset="2"/>
+              <a:buChar char="l"/>
             </a:pPr>
             <a:r>
               <a:rPr lang="ja-JP" altLang="en-US" sz="2000" b="0" i="0" dirty="0">
@@ -6644,155 +6949,184 @@
         </p:spPr>
         <p:txBody>
           <a:bodyPr>
-            <a:normAutofit lnSpcReduction="10000"/>
+            <a:normAutofit fontScale="92500" lnSpcReduction="10000"/>
           </a:bodyPr>
           <a:lstStyle/>
           <a:p>
-            <a:pPr>
+            <a:pPr marL="0" indent="0">
               <a:lnSpc>
                 <a:spcPct val="120000"/>
               </a:lnSpc>
+              <a:buNone/>
             </a:pPr>
             <a:r>
-              <a:rPr kumimoji="1" lang="en-US" altLang="ja-JP"/>
+              <a:rPr kumimoji="1" lang="en-US" altLang="ja-JP" b="1" dirty="0"/>
               <a:t>206</a:t>
             </a:r>
             <a:r>
-              <a:rPr kumimoji="1" lang="ja-JP" altLang="en-US"/>
+              <a:rPr kumimoji="1" lang="ja-JP" altLang="en-US" b="1" dirty="0"/>
               <a:t>種の薬の作用機序</a:t>
             </a:r>
             <a:r>
-              <a:rPr kumimoji="1" lang="en-US" altLang="ja-JP"/>
-              <a:t>(MoA)</a:t>
-            </a:r>
-            <a:r>
-              <a:rPr kumimoji="1" lang="ja-JP" altLang="en-US"/>
+              <a:rPr kumimoji="1" lang="en-US" altLang="ja-JP" b="1" dirty="0"/>
+              <a:t>(</a:t>
+            </a:r>
+            <a:r>
+              <a:rPr kumimoji="1" lang="en-US" altLang="ja-JP" b="1" dirty="0" err="1"/>
+              <a:t>MoA</a:t>
+            </a:r>
+            <a:r>
+              <a:rPr kumimoji="1" lang="en-US" altLang="ja-JP" b="1" dirty="0"/>
+              <a:t>)</a:t>
+            </a:r>
+            <a:r>
+              <a:rPr kumimoji="1" lang="ja-JP" altLang="en-US" b="1" dirty="0"/>
               <a:t>の応答</a:t>
             </a:r>
             <a:r>
-              <a:rPr lang="ja-JP" altLang="en-US"/>
+              <a:rPr lang="ja-JP" altLang="en-US" b="1" dirty="0"/>
               <a:t>（</a:t>
             </a:r>
             <a:r>
-              <a:rPr kumimoji="1" lang="en-US" altLang="ja-JP"/>
+              <a:rPr kumimoji="1" lang="en-US" altLang="ja-JP" b="1" dirty="0"/>
               <a:t>0/1</a:t>
             </a:r>
             <a:r>
-              <a:rPr lang="ja-JP" altLang="en-US"/>
+              <a:rPr lang="ja-JP" altLang="en-US" b="1" dirty="0"/>
               <a:t>）</a:t>
             </a:r>
-            <a:endParaRPr kumimoji="1" lang="en-US" altLang="ja-JP"/>
-          </a:p>
-          <a:p>
-            <a:pPr lvl="1">
+            <a:endParaRPr lang="en-US" altLang="ja-JP" b="1" dirty="0"/>
+          </a:p>
+          <a:p>
+            <a:pPr marL="360000" indent="-360000">
               <a:lnSpc>
                 <a:spcPct val="120000"/>
               </a:lnSpc>
+              <a:buClr>
+                <a:schemeClr val="accent5"/>
+              </a:buClr>
+              <a:buFont typeface="Wingdings" panose="05000000000000000000" pitchFamily="2" charset="2"/>
+              <a:buChar char="l"/>
             </a:pPr>
             <a:r>
-              <a:rPr kumimoji="1" lang="en-US" altLang="ja-JP"/>
+              <a:rPr kumimoji="1" lang="en-US" altLang="ja-JP" sz="2600" dirty="0"/>
               <a:t>1</a:t>
             </a:r>
             <a:r>
-              <a:rPr kumimoji="1" lang="ja-JP" altLang="en-US"/>
+              <a:rPr kumimoji="1" lang="ja-JP" altLang="en-US" sz="2600" dirty="0"/>
               <a:t>列</a:t>
             </a:r>
             <a:r>
-              <a:rPr kumimoji="1" lang="en-US" altLang="ja-JP"/>
+              <a:rPr kumimoji="1" lang="en-US" altLang="ja-JP" sz="2600" dirty="0"/>
               <a:t>1</a:t>
             </a:r>
             <a:r>
-              <a:rPr kumimoji="1" lang="ja-JP" altLang="en-US"/>
+              <a:rPr kumimoji="1" lang="ja-JP" altLang="en-US" sz="2600" dirty="0"/>
               <a:t>クラス</a:t>
             </a:r>
             <a:r>
-              <a:rPr lang="ja-JP" altLang="en-US"/>
+              <a:rPr lang="ja-JP" altLang="en-US" sz="2600" dirty="0"/>
               <a:t>。クラス名が薬の名前</a:t>
             </a:r>
-            <a:endParaRPr kumimoji="1" lang="en-US" altLang="ja-JP"/>
-          </a:p>
-          <a:p>
-            <a:pPr lvl="1">
+            <a:endParaRPr lang="en-US" altLang="ja-JP" sz="2600" dirty="0"/>
+          </a:p>
+          <a:p>
+            <a:pPr marL="360000" indent="-360000">
               <a:lnSpc>
                 <a:spcPct val="120000"/>
               </a:lnSpc>
+              <a:buClr>
+                <a:schemeClr val="accent5"/>
+              </a:buClr>
+              <a:buFont typeface="Wingdings" panose="05000000000000000000" pitchFamily="2" charset="2"/>
+              <a:buChar char="l"/>
             </a:pPr>
             <a:r>
-              <a:rPr kumimoji="1" lang="ja-JP" altLang="en-US"/>
+              <a:rPr kumimoji="1" lang="ja-JP" altLang="en-US" sz="2600" dirty="0"/>
               <a:t>薬は </a:t>
             </a:r>
             <a:r>
-              <a:rPr kumimoji="1" lang="en-US" altLang="ja-JP"/>
+              <a:rPr kumimoji="1" lang="en-US" altLang="ja-JP" sz="2600" dirty="0"/>
               <a:t>5α</a:t>
             </a:r>
             <a:r>
-              <a:rPr kumimoji="1" lang="ja-JP" altLang="en-US"/>
+              <a:rPr kumimoji="1" lang="ja-JP" altLang="en-US" sz="2600" dirty="0"/>
               <a:t>還元酵素阻害剤、</a:t>
             </a:r>
             <a:r>
-              <a:rPr kumimoji="1" lang="en-US" altLang="ja-JP"/>
+              <a:rPr kumimoji="1" lang="en-US" altLang="ja-JP" sz="2600" dirty="0"/>
               <a:t>11-β-HSD1</a:t>
             </a:r>
             <a:r>
-              <a:rPr kumimoji="1" lang="ja-JP" altLang="en-US"/>
+              <a:rPr kumimoji="1" lang="ja-JP" altLang="en-US" sz="2600" dirty="0"/>
               <a:t>阻害剤 など</a:t>
             </a:r>
-            <a:endParaRPr kumimoji="1" lang="en-US" altLang="ja-JP"/>
-          </a:p>
-          <a:p>
-            <a:pPr>
+            <a:endParaRPr kumimoji="1" lang="en-US" altLang="ja-JP" sz="2600" dirty="0"/>
+          </a:p>
+          <a:p>
+            <a:pPr marL="360000" indent="-360000">
               <a:lnSpc>
                 <a:spcPct val="120000"/>
               </a:lnSpc>
+              <a:buClr>
+                <a:schemeClr val="accent5"/>
+              </a:buClr>
+              <a:buFont typeface="Wingdings" panose="05000000000000000000" pitchFamily="2" charset="2"/>
+              <a:buChar char="l"/>
             </a:pPr>
             <a:r>
-              <a:rPr kumimoji="1" lang="ja-JP" altLang="en-US"/>
+              <a:rPr kumimoji="1" lang="ja-JP" altLang="en-US" sz="2600" dirty="0"/>
               <a:t>マルチラベル</a:t>
             </a:r>
-            <a:endParaRPr kumimoji="1" lang="en-US" altLang="ja-JP"/>
-          </a:p>
-          <a:p>
-            <a:pPr>
+            <a:endParaRPr kumimoji="1" lang="en-US" altLang="ja-JP" sz="2600" dirty="0"/>
+          </a:p>
+          <a:p>
+            <a:pPr marL="360000" indent="-360000">
               <a:lnSpc>
                 <a:spcPct val="120000"/>
               </a:lnSpc>
+              <a:buClr>
+                <a:schemeClr val="accent5"/>
+              </a:buClr>
+              <a:buFont typeface="Wingdings" panose="05000000000000000000" pitchFamily="2" charset="2"/>
+              <a:buChar char="l"/>
             </a:pPr>
             <a:r>
-              <a:rPr lang="ja-JP" altLang="en-US" b="0" i="0">
+              <a:rPr lang="ja-JP" altLang="en-US" sz="2600" b="0" i="0" dirty="0">
                 <a:effectLst/>
                 <a:latin typeface="Inter"/>
               </a:rPr>
               <a:t>非常に不均衡（</a:t>
             </a:r>
             <a:r>
-              <a:rPr lang="en-US" altLang="ja-JP" b="0" i="0">
+              <a:rPr lang="en-US" altLang="ja-JP" sz="2600" b="0" i="0" dirty="0">
                 <a:effectLst/>
                 <a:latin typeface="Inter"/>
               </a:rPr>
               <a:t>0</a:t>
             </a:r>
             <a:r>
-              <a:rPr lang="ja-JP" altLang="en-US" b="0" i="0">
+              <a:rPr lang="ja-JP" altLang="en-US" sz="2600" b="0" i="0" dirty="0">
                 <a:effectLst/>
                 <a:latin typeface="Inter"/>
               </a:rPr>
               <a:t>のラベルが大半で</a:t>
             </a:r>
             <a:r>
-              <a:rPr lang="en-US" altLang="ja-JP" b="0" i="0">
+              <a:rPr lang="en-US" altLang="ja-JP" sz="2600" b="0" i="0" dirty="0">
                 <a:effectLst/>
                 <a:latin typeface="Inter"/>
               </a:rPr>
               <a:t>1</a:t>
             </a:r>
             <a:r>
-              <a:rPr lang="ja-JP" altLang="en-US" b="0" i="0">
+              <a:rPr lang="ja-JP" altLang="en-US" sz="2600" b="0" i="0" dirty="0">
                 <a:effectLst/>
                 <a:latin typeface="Inter"/>
               </a:rPr>
               <a:t>のラベルが非常に少ない）</a:t>
             </a:r>
-            <a:endParaRPr kumimoji="1" lang="en-US" altLang="ja-JP" dirty="0"/>
+            <a:endParaRPr kumimoji="1" lang="en-US" altLang="ja-JP" sz="2600" dirty="0"/>
           </a:p>
         </p:txBody>
       </p:sp>
@@ -6919,24 +7253,25 @@
           </a:bodyPr>
           <a:lstStyle/>
           <a:p>
-            <a:pPr>
+            <a:pPr marL="0" indent="0">
               <a:lnSpc>
                 <a:spcPct val="110000"/>
               </a:lnSpc>
+              <a:buNone/>
             </a:pPr>
             <a:r>
-              <a:rPr kumimoji="1" lang="ja-JP" altLang="en-US" dirty="0"/>
+              <a:rPr kumimoji="1" lang="ja-JP" altLang="en-US" b="1" dirty="0"/>
               <a:t>各クラスの</a:t>
             </a:r>
             <a:r>
-              <a:rPr kumimoji="1" lang="en-US" altLang="ja-JP" dirty="0" err="1"/>
+              <a:rPr kumimoji="1" lang="en-US" altLang="ja-JP" b="1" dirty="0" err="1"/>
               <a:t>log_loss</a:t>
             </a:r>
             <a:r>
-              <a:rPr kumimoji="1" lang="ja-JP" altLang="en-US" dirty="0"/>
+              <a:rPr kumimoji="1" lang="ja-JP" altLang="en-US" b="1" dirty="0"/>
               <a:t>の平均値</a:t>
             </a:r>
-            <a:endParaRPr kumimoji="1" lang="en-US" altLang="ja-JP" dirty="0"/>
+            <a:endParaRPr kumimoji="1" lang="en-US" altLang="ja-JP" b="1" dirty="0"/>
           </a:p>
         </p:txBody>
       </p:sp>

</xml_diff>